<commit_message>
added sfs comparison graphics, updated slides for rotation meeting.
</commit_message>
<xml_diff>
--- a/Summary/20210125_demo_for_ccgb_rotation_update.pptx
+++ b/Summary/20210125_demo_for_ccgb_rotation_update.pptx
@@ -5,7 +5,7 @@
     <p:sldMasterId id="2147483648" r:id="rId1"/>
   </p:sldMasterIdLst>
   <p:notesMasterIdLst>
-    <p:notesMasterId r:id="rId20"/>
+    <p:notesMasterId r:id="rId25"/>
   </p:notesMasterIdLst>
   <p:sldIdLst>
     <p:sldId id="256" r:id="rId2"/>
@@ -15,17 +15,22 @@
     <p:sldId id="290" r:id="rId6"/>
     <p:sldId id="291" r:id="rId7"/>
     <p:sldId id="295" r:id="rId8"/>
-    <p:sldId id="293" r:id="rId9"/>
-    <p:sldId id="292" r:id="rId10"/>
-    <p:sldId id="294" r:id="rId11"/>
-    <p:sldId id="296" r:id="rId12"/>
-    <p:sldId id="301" r:id="rId13"/>
-    <p:sldId id="297" r:id="rId14"/>
-    <p:sldId id="298" r:id="rId15"/>
-    <p:sldId id="299" r:id="rId16"/>
-    <p:sldId id="300" r:id="rId17"/>
-    <p:sldId id="278" r:id="rId18"/>
-    <p:sldId id="273" r:id="rId19"/>
+    <p:sldId id="311" r:id="rId9"/>
+    <p:sldId id="293" r:id="rId10"/>
+    <p:sldId id="307" r:id="rId11"/>
+    <p:sldId id="292" r:id="rId12"/>
+    <p:sldId id="308" r:id="rId13"/>
+    <p:sldId id="294" r:id="rId14"/>
+    <p:sldId id="309" r:id="rId15"/>
+    <p:sldId id="296" r:id="rId16"/>
+    <p:sldId id="310" r:id="rId17"/>
+    <p:sldId id="301" r:id="rId18"/>
+    <p:sldId id="297" r:id="rId19"/>
+    <p:sldId id="298" r:id="rId20"/>
+    <p:sldId id="299" r:id="rId21"/>
+    <p:sldId id="300" r:id="rId22"/>
+    <p:sldId id="278" r:id="rId23"/>
+    <p:sldId id="273" r:id="rId24"/>
   </p:sldIdLst>
   <p:sldSz cx="12192000" cy="6858000"/>
   <p:notesSz cx="6858000" cy="9144000"/>
@@ -136,10 +141,15 @@
             <p14:sldId id="290"/>
             <p14:sldId id="291"/>
             <p14:sldId id="295"/>
+            <p14:sldId id="311"/>
             <p14:sldId id="293"/>
+            <p14:sldId id="307"/>
             <p14:sldId id="292"/>
+            <p14:sldId id="308"/>
             <p14:sldId id="294"/>
+            <p14:sldId id="309"/>
             <p14:sldId id="296"/>
+            <p14:sldId id="310"/>
             <p14:sldId id="301"/>
             <p14:sldId id="297"/>
             <p14:sldId id="298"/>
@@ -740,7 +750,7 @@
           <a:p>
             <a:fld id="{9D984E8B-8157-4976-ABDF-6DA2CAC3440F}" type="slidenum">
               <a:rPr lang="en-US" smtClean="0"/>
-              <a:t>17</a:t>
+              <a:t>22</a:t>
             </a:fld>
             <a:endParaRPr lang="en-US"/>
           </a:p>
@@ -4134,6 +4144,1114 @@
           <p:cNvPr id="2" name="Title 1">
             <a:extLst>
               <a:ext uri="{FF2B5EF4-FFF2-40B4-BE49-F238E27FC236}">
+                <a16:creationId xmlns:a16="http://schemas.microsoft.com/office/drawing/2014/main" id="{DFBD00F2-943C-4088-9EFD-ED0AD1B6E3BB}"/>
+              </a:ext>
+            </a:extLst>
+          </p:cNvPr>
+          <p:cNvSpPr>
+            <a:spLocks noGrp="1"/>
+          </p:cNvSpPr>
+          <p:nvPr>
+            <p:ph type="title"/>
+          </p:nvPr>
+        </p:nvSpPr>
+        <p:spPr/>
+        <p:txBody>
+          <a:bodyPr/>
+          <a:lstStyle/>
+          <a:p>
+            <a:r>
+              <a:rPr lang="en-US" dirty="0"/>
+              <a:t>Bacteroides </a:t>
+            </a:r>
+            <a:r>
+              <a:rPr lang="en-US" dirty="0" err="1"/>
+              <a:t>ovatus</a:t>
+            </a:r>
+            <a:r>
+              <a:rPr lang="en-US" dirty="0"/>
+              <a:t> SFS comparison</a:t>
+            </a:r>
+          </a:p>
+        </p:txBody>
+      </p:sp>
+      <p:pic>
+        <p:nvPicPr>
+          <p:cNvPr id="5" name="Content Placeholder 4" descr="Chart, histogram&#10;&#10;Description automatically generated">
+            <a:extLst>
+              <a:ext uri="{FF2B5EF4-FFF2-40B4-BE49-F238E27FC236}">
+                <a16:creationId xmlns:a16="http://schemas.microsoft.com/office/drawing/2014/main" id="{4CF3A92A-9A91-4300-95B4-EC0FF606DA97}"/>
+              </a:ext>
+            </a:extLst>
+          </p:cNvPr>
+          <p:cNvPicPr>
+            <a:picLocks noGrp="1" noChangeAspect="1"/>
+          </p:cNvPicPr>
+          <p:nvPr>
+            <p:ph idx="1"/>
+          </p:nvPr>
+        </p:nvPicPr>
+        <p:blipFill>
+          <a:blip r:embed="rId2">
+            <a:extLst>
+              <a:ext uri="{28A0092B-C50C-407E-A947-70E740481C1C}">
+                <a14:useLocalDpi xmlns:a14="http://schemas.microsoft.com/office/drawing/2010/main" val="0"/>
+              </a:ext>
+            </a:extLst>
+          </a:blip>
+          <a:stretch>
+            <a:fillRect/>
+          </a:stretch>
+        </p:blipFill>
+        <p:spPr>
+          <a:xfrm>
+            <a:off x="100932" y="1371600"/>
+            <a:ext cx="8070504" cy="5486400"/>
+          </a:xfrm>
+        </p:spPr>
+      </p:pic>
+      <p:sp>
+        <p:nvSpPr>
+          <p:cNvPr id="6" name="TextBox 5">
+            <a:extLst>
+              <a:ext uri="{FF2B5EF4-FFF2-40B4-BE49-F238E27FC236}">
+                <a16:creationId xmlns:a16="http://schemas.microsoft.com/office/drawing/2014/main" id="{CD8EDC76-D9BE-4E41-89CA-9A03A1FEAF60}"/>
+              </a:ext>
+            </a:extLst>
+          </p:cNvPr>
+          <p:cNvSpPr txBox="1"/>
+          <p:nvPr/>
+        </p:nvSpPr>
+        <p:spPr>
+          <a:xfrm>
+            <a:off x="8440157" y="1690688"/>
+            <a:ext cx="3482235" cy="2862322"/>
+          </a:xfrm>
+          <a:prstGeom prst="rect">
+            <a:avLst/>
+          </a:prstGeom>
+          <a:noFill/>
+        </p:spPr>
+        <p:txBody>
+          <a:bodyPr wrap="square" rtlCol="0">
+            <a:spAutoFit/>
+          </a:bodyPr>
+          <a:lstStyle/>
+          <a:p>
+            <a:pPr marL="285750" indent="-285750">
+              <a:buFont typeface="Arial" panose="020B0604020202020204" pitchFamily="34" charset="0"/>
+              <a:buChar char="•"/>
+            </a:pPr>
+            <a:r>
+              <a:rPr lang="en-US" dirty="0"/>
+              <a:t>The empirical </a:t>
+            </a:r>
+            <a:r>
+              <a:rPr lang="en-US" dirty="0" err="1"/>
+              <a:t>sfs</a:t>
+            </a:r>
+            <a:r>
+              <a:rPr lang="en-US" dirty="0"/>
+              <a:t> is shown in blue, while the expected SFS under different demographic models is shown in either black, orange, green, or red.</a:t>
+            </a:r>
+          </a:p>
+          <a:p>
+            <a:pPr marL="285750" indent="-285750">
+              <a:buFont typeface="Arial" panose="020B0604020202020204" pitchFamily="34" charset="0"/>
+              <a:buChar char="•"/>
+            </a:pPr>
+            <a:r>
+              <a:rPr lang="en-US" dirty="0"/>
+              <a:t>The expected SFS’s have high precision, i.e., are close to each other, but visibly differ from the empirical SFS, particularly are higher allele frequencies.</a:t>
+            </a:r>
+          </a:p>
+        </p:txBody>
+      </p:sp>
+    </p:spTree>
+    <p:extLst>
+      <p:ext uri="{BB962C8B-B14F-4D97-AF65-F5344CB8AC3E}">
+        <p14:creationId xmlns:p14="http://schemas.microsoft.com/office/powerpoint/2010/main" val="3511488418"/>
+      </p:ext>
+    </p:extLst>
+  </p:cSld>
+  <p:clrMapOvr>
+    <a:masterClrMapping/>
+  </p:clrMapOvr>
+</p:sld>
+</file>
+
+<file path=ppt/slides/slide11.xml><?xml version="1.0" encoding="utf-8"?>
+<p:sld xmlns:a="http://schemas.openxmlformats.org/drawingml/2006/main" xmlns:r="http://schemas.openxmlformats.org/officeDocument/2006/relationships" xmlns:p="http://schemas.openxmlformats.org/presentationml/2006/main">
+  <p:cSld>
+    <p:spTree>
+      <p:nvGrpSpPr>
+        <p:cNvPr id="1" name=""/>
+        <p:cNvGrpSpPr/>
+        <p:nvPr/>
+      </p:nvGrpSpPr>
+      <p:grpSpPr>
+        <a:xfrm>
+          <a:off x="0" y="0"/>
+          <a:ext cx="0" cy="0"/>
+          <a:chOff x="0" y="0"/>
+          <a:chExt cx="0" cy="0"/>
+        </a:xfrm>
+      </p:grpSpPr>
+      <p:sp>
+        <p:nvSpPr>
+          <p:cNvPr id="2" name="Title 1">
+            <a:extLst>
+              <a:ext uri="{FF2B5EF4-FFF2-40B4-BE49-F238E27FC236}">
+                <a16:creationId xmlns:a16="http://schemas.microsoft.com/office/drawing/2014/main" id="{FC0C9624-1DBB-4B7A-B446-0EC6DD7756EB}"/>
+              </a:ext>
+            </a:extLst>
+          </p:cNvPr>
+          <p:cNvSpPr>
+            <a:spLocks noGrp="1"/>
+          </p:cNvSpPr>
+          <p:nvPr>
+            <p:ph type="title"/>
+          </p:nvPr>
+        </p:nvSpPr>
+        <p:spPr/>
+        <p:txBody>
+          <a:bodyPr/>
+          <a:lstStyle/>
+          <a:p>
+            <a:r>
+              <a:rPr lang="en-US" dirty="0" err="1"/>
+              <a:t>Alistipes</a:t>
+            </a:r>
+            <a:r>
+              <a:rPr lang="en-US" dirty="0"/>
+              <a:t> </a:t>
+            </a:r>
+            <a:r>
+              <a:rPr lang="en-US" dirty="0" err="1"/>
+              <a:t>putredinis</a:t>
+            </a:r>
+            <a:endParaRPr lang="en-US" dirty="0"/>
+          </a:p>
+        </p:txBody>
+      </p:sp>
+      <p:pic>
+        <p:nvPicPr>
+          <p:cNvPr id="5" name="Picture 4">
+            <a:extLst>
+              <a:ext uri="{FF2B5EF4-FFF2-40B4-BE49-F238E27FC236}">
+                <a16:creationId xmlns:a16="http://schemas.microsoft.com/office/drawing/2014/main" id="{F3BC6FCC-6644-42E6-95F0-9583E821429C}"/>
+              </a:ext>
+            </a:extLst>
+          </p:cNvPr>
+          <p:cNvPicPr>
+            <a:picLocks noChangeAspect="1"/>
+          </p:cNvPicPr>
+          <p:nvPr/>
+        </p:nvPicPr>
+        <p:blipFill>
+          <a:blip r:embed="rId2"/>
+          <a:stretch>
+            <a:fillRect/>
+          </a:stretch>
+        </p:blipFill>
+        <p:spPr>
+          <a:xfrm>
+            <a:off x="153870" y="1396409"/>
+            <a:ext cx="7272953" cy="3001130"/>
+          </a:xfrm>
+          <a:prstGeom prst="rect">
+            <a:avLst/>
+          </a:prstGeom>
+        </p:spPr>
+      </p:pic>
+      <p:graphicFrame>
+        <p:nvGraphicFramePr>
+          <p:cNvPr id="4" name="Table 4">
+            <a:extLst>
+              <a:ext uri="{FF2B5EF4-FFF2-40B4-BE49-F238E27FC236}">
+                <a16:creationId xmlns:a16="http://schemas.microsoft.com/office/drawing/2014/main" id="{CED22545-7642-43E5-9E8E-C73593CC5F0F}"/>
+              </a:ext>
+            </a:extLst>
+          </p:cNvPr>
+          <p:cNvGraphicFramePr>
+            <a:graphicFrameLocks noGrp="1"/>
+          </p:cNvGraphicFramePr>
+          <p:nvPr>
+            <p:ph idx="1"/>
+            <p:extLst>
+              <p:ext uri="{D42A27DB-BD31-4B8C-83A1-F6EECF244321}">
+                <p14:modId xmlns:p14="http://schemas.microsoft.com/office/powerpoint/2010/main" val="1359262666"/>
+              </p:ext>
+            </p:extLst>
+          </p:nvPr>
+        </p:nvGraphicFramePr>
+        <p:xfrm>
+          <a:off x="828368" y="4397539"/>
+          <a:ext cx="10515600" cy="2225040"/>
+        </p:xfrm>
+        <a:graphic>
+          <a:graphicData uri="http://schemas.openxmlformats.org/drawingml/2006/table">
+            <a:tbl>
+              <a:tblPr firstRow="1" bandRow="1">
+                <a:tableStyleId>{073A0DAA-6AF3-43AB-8588-CEC1D06C72B9}</a:tableStyleId>
+              </a:tblPr>
+              <a:tblGrid>
+                <a:gridCol w="2103120">
+                  <a:extLst>
+                    <a:ext uri="{9D8B030D-6E8A-4147-A177-3AD203B41FA5}">
+                      <a16:colId xmlns:a16="http://schemas.microsoft.com/office/drawing/2014/main" val="2900726404"/>
+                    </a:ext>
+                  </a:extLst>
+                </a:gridCol>
+                <a:gridCol w="2103120">
+                  <a:extLst>
+                    <a:ext uri="{9D8B030D-6E8A-4147-A177-3AD203B41FA5}">
+                      <a16:colId xmlns:a16="http://schemas.microsoft.com/office/drawing/2014/main" val="2297780930"/>
+                    </a:ext>
+                  </a:extLst>
+                </a:gridCol>
+                <a:gridCol w="2103120">
+                  <a:extLst>
+                    <a:ext uri="{9D8B030D-6E8A-4147-A177-3AD203B41FA5}">
+                      <a16:colId xmlns:a16="http://schemas.microsoft.com/office/drawing/2014/main" val="1352057416"/>
+                    </a:ext>
+                  </a:extLst>
+                </a:gridCol>
+                <a:gridCol w="2103120">
+                  <a:extLst>
+                    <a:ext uri="{9D8B030D-6E8A-4147-A177-3AD203B41FA5}">
+                      <a16:colId xmlns:a16="http://schemas.microsoft.com/office/drawing/2014/main" val="1457082074"/>
+                    </a:ext>
+                  </a:extLst>
+                </a:gridCol>
+                <a:gridCol w="2103120">
+                  <a:extLst>
+                    <a:ext uri="{9D8B030D-6E8A-4147-A177-3AD203B41FA5}">
+                      <a16:colId xmlns:a16="http://schemas.microsoft.com/office/drawing/2014/main" val="633438695"/>
+                    </a:ext>
+                  </a:extLst>
+                </a:gridCol>
+              </a:tblGrid>
+              <a:tr h="370840">
+                <a:tc>
+                  <a:txBody>
+                    <a:bodyPr/>
+                    <a:lstStyle/>
+                    <a:p>
+                      <a:r>
+                        <a:rPr lang="en-US" dirty="0"/>
+                        <a:t>Model</a:t>
+                      </a:r>
+                    </a:p>
+                  </a:txBody>
+                  <a:tcPr/>
+                </a:tc>
+                <a:tc>
+                  <a:txBody>
+                    <a:bodyPr/>
+                    <a:lstStyle/>
+                    <a:p>
+                      <a:r>
+                        <a:rPr lang="en-US" dirty="0"/>
+                        <a:t>Exponential growth</a:t>
+                      </a:r>
+                    </a:p>
+                  </a:txBody>
+                  <a:tcPr/>
+                </a:tc>
+                <a:tc>
+                  <a:txBody>
+                    <a:bodyPr/>
+                    <a:lstStyle/>
+                    <a:p>
+                      <a:r>
+                        <a:rPr lang="en-US" dirty="0"/>
+                        <a:t>Two-epoch</a:t>
+                      </a:r>
+                    </a:p>
+                  </a:txBody>
+                  <a:tcPr/>
+                </a:tc>
+                <a:tc>
+                  <a:txBody>
+                    <a:bodyPr/>
+                    <a:lstStyle/>
+                    <a:p>
+                      <a:r>
+                        <a:rPr lang="en-US" dirty="0"/>
+                        <a:t>Bottleneck + growth</a:t>
+                      </a:r>
+                    </a:p>
+                  </a:txBody>
+                  <a:tcPr/>
+                </a:tc>
+                <a:tc>
+                  <a:txBody>
+                    <a:bodyPr/>
+                    <a:lstStyle/>
+                    <a:p>
+                      <a:r>
+                        <a:rPr lang="en-US" dirty="0"/>
+                        <a:t>Three-epoch</a:t>
+                      </a:r>
+                    </a:p>
+                  </a:txBody>
+                  <a:tcPr/>
+                </a:tc>
+                <a:extLst>
+                  <a:ext uri="{0D108BD9-81ED-4DB2-BD59-A6C34878D82A}">
+                    <a16:rowId xmlns:a16="http://schemas.microsoft.com/office/drawing/2014/main" val="3143057051"/>
+                  </a:ext>
+                </a:extLst>
+              </a:tr>
+              <a:tr h="370840">
+                <a:tc>
+                  <a:txBody>
+                    <a:bodyPr/>
+                    <a:lstStyle/>
+                    <a:p>
+                      <a:r>
+                        <a:rPr lang="en-US" dirty="0"/>
+                        <a:t>Log Likelihood</a:t>
+                      </a:r>
+                    </a:p>
+                  </a:txBody>
+                  <a:tcPr/>
+                </a:tc>
+                <a:tc>
+                  <a:txBody>
+                    <a:bodyPr/>
+                    <a:lstStyle/>
+                    <a:p>
+                      <a:r>
+                        <a:rPr lang="en-US" dirty="0"/>
+                        <a:t>-417.014902652</a:t>
+                      </a:r>
+                    </a:p>
+                  </a:txBody>
+                  <a:tcPr/>
+                </a:tc>
+                <a:tc>
+                  <a:txBody>
+                    <a:bodyPr/>
+                    <a:lstStyle/>
+                    <a:p>
+                      <a:r>
+                        <a:rPr lang="en-US" dirty="0">
+                          <a:highlight>
+                            <a:srgbClr val="FFFF00"/>
+                          </a:highlight>
+                        </a:rPr>
+                        <a:t>-283.836375864</a:t>
+                      </a:r>
+                    </a:p>
+                  </a:txBody>
+                  <a:tcPr/>
+                </a:tc>
+                <a:tc>
+                  <a:txBody>
+                    <a:bodyPr/>
+                    <a:lstStyle/>
+                    <a:p>
+                      <a:r>
+                        <a:rPr lang="en-US" dirty="0">
+                          <a:solidFill>
+                            <a:schemeClr val="tx1"/>
+                          </a:solidFill>
+                        </a:rPr>
+                        <a:t>-291.177506155</a:t>
+                      </a:r>
+                      <a:endParaRPr lang="en-US" dirty="0">
+                        <a:solidFill>
+                          <a:schemeClr val="tx1"/>
+                        </a:solidFill>
+                        <a:highlight>
+                          <a:srgbClr val="FFFF00"/>
+                        </a:highlight>
+                      </a:endParaRPr>
+                    </a:p>
+                  </a:txBody>
+                  <a:tcPr/>
+                </a:tc>
+                <a:tc>
+                  <a:txBody>
+                    <a:bodyPr/>
+                    <a:lstStyle/>
+                    <a:p>
+                      <a:r>
+                        <a:rPr lang="en-US" sz="1800" kern="1200" dirty="0">
+                          <a:solidFill>
+                            <a:schemeClr val="tx1"/>
+                          </a:solidFill>
+                          <a:latin typeface="+mn-lt"/>
+                          <a:ea typeface="+mn-ea"/>
+                          <a:cs typeface="+mn-cs"/>
+                        </a:rPr>
+                        <a:t>-284.467464745</a:t>
+                      </a:r>
+                      <a:endParaRPr lang="en-US" dirty="0">
+                        <a:solidFill>
+                          <a:schemeClr val="tx1"/>
+                        </a:solidFill>
+                      </a:endParaRPr>
+                    </a:p>
+                  </a:txBody>
+                  <a:tcPr/>
+                </a:tc>
+                <a:extLst>
+                  <a:ext uri="{0D108BD9-81ED-4DB2-BD59-A6C34878D82A}">
+                    <a16:rowId xmlns:a16="http://schemas.microsoft.com/office/drawing/2014/main" val="3235037204"/>
+                  </a:ext>
+                </a:extLst>
+              </a:tr>
+              <a:tr h="370840">
+                <a:tc>
+                  <a:txBody>
+                    <a:bodyPr/>
+                    <a:lstStyle/>
+                    <a:p>
+                      <a:r>
+                        <a:rPr lang="en-US" dirty="0" err="1"/>
+                        <a:t>Nu_a</a:t>
+                      </a:r>
+                      <a:endParaRPr lang="en-US" dirty="0"/>
+                    </a:p>
+                  </a:txBody>
+                  <a:tcPr/>
+                </a:tc>
+                <a:tc>
+                  <a:txBody>
+                    <a:bodyPr/>
+                    <a:lstStyle/>
+                    <a:p>
+                      <a:r>
+                        <a:rPr lang="en-US" dirty="0"/>
+                        <a:t>37.70628513</a:t>
+                      </a:r>
+                    </a:p>
+                  </a:txBody>
+                  <a:tcPr/>
+                </a:tc>
+                <a:tc>
+                  <a:txBody>
+                    <a:bodyPr/>
+                    <a:lstStyle/>
+                    <a:p>
+                      <a:r>
+                        <a:rPr lang="en-US" dirty="0"/>
+                        <a:t>12.85982032</a:t>
+                      </a:r>
+                    </a:p>
+                  </a:txBody>
+                  <a:tcPr/>
+                </a:tc>
+                <a:tc>
+                  <a:txBody>
+                    <a:bodyPr/>
+                    <a:lstStyle/>
+                    <a:p>
+                      <a:r>
+                        <a:rPr lang="en-US" dirty="0">
+                          <a:solidFill>
+                            <a:schemeClr val="tx1"/>
+                          </a:solidFill>
+                        </a:rPr>
+                        <a:t>40.83825475</a:t>
+                      </a:r>
+                    </a:p>
+                  </a:txBody>
+                  <a:tcPr/>
+                </a:tc>
+                <a:tc>
+                  <a:txBody>
+                    <a:bodyPr/>
+                    <a:lstStyle/>
+                    <a:p>
+                      <a:r>
+                        <a:rPr lang="en-US" sz="1800" kern="1200" dirty="0">
+                          <a:solidFill>
+                            <a:schemeClr val="tx1"/>
+                          </a:solidFill>
+                          <a:latin typeface="+mn-lt"/>
+                          <a:ea typeface="+mn-ea"/>
+                          <a:cs typeface="+mn-cs"/>
+                        </a:rPr>
+                        <a:t>0.01045419</a:t>
+                      </a:r>
+                      <a:endParaRPr lang="en-US" dirty="0">
+                        <a:solidFill>
+                          <a:schemeClr val="tx1"/>
+                        </a:solidFill>
+                      </a:endParaRPr>
+                    </a:p>
+                  </a:txBody>
+                  <a:tcPr/>
+                </a:tc>
+                <a:extLst>
+                  <a:ext uri="{0D108BD9-81ED-4DB2-BD59-A6C34878D82A}">
+                    <a16:rowId xmlns:a16="http://schemas.microsoft.com/office/drawing/2014/main" val="2717148640"/>
+                  </a:ext>
+                </a:extLst>
+              </a:tr>
+              <a:tr h="370840">
+                <a:tc>
+                  <a:txBody>
+                    <a:bodyPr/>
+                    <a:lstStyle/>
+                    <a:p>
+                      <a:r>
+                        <a:rPr lang="en-US" dirty="0" err="1"/>
+                        <a:t>Nu_b</a:t>
+                      </a:r>
+                      <a:endParaRPr lang="en-US" dirty="0"/>
+                    </a:p>
+                  </a:txBody>
+                  <a:tcPr/>
+                </a:tc>
+                <a:tc>
+                  <a:txBody>
+                    <a:bodyPr/>
+                    <a:lstStyle/>
+                    <a:p>
+                      <a:r>
+                        <a:rPr lang="en-US" dirty="0"/>
+                        <a:t>N/A</a:t>
+                      </a:r>
+                    </a:p>
+                  </a:txBody>
+                  <a:tcPr/>
+                </a:tc>
+                <a:tc>
+                  <a:txBody>
+                    <a:bodyPr/>
+                    <a:lstStyle/>
+                    <a:p>
+                      <a:r>
+                        <a:rPr lang="en-US" dirty="0"/>
+                        <a:t>N/A</a:t>
+                      </a:r>
+                    </a:p>
+                  </a:txBody>
+                  <a:tcPr/>
+                </a:tc>
+                <a:tc>
+                  <a:txBody>
+                    <a:bodyPr/>
+                    <a:lstStyle/>
+                    <a:p>
+                      <a:r>
+                        <a:rPr lang="en-US" dirty="0">
+                          <a:solidFill>
+                            <a:schemeClr val="tx1"/>
+                          </a:solidFill>
+                        </a:rPr>
+                        <a:t>51.02541362</a:t>
+                      </a:r>
+                    </a:p>
+                  </a:txBody>
+                  <a:tcPr/>
+                </a:tc>
+                <a:tc>
+                  <a:txBody>
+                    <a:bodyPr/>
+                    <a:lstStyle/>
+                    <a:p>
+                      <a:r>
+                        <a:rPr lang="en-US" sz="1800" kern="1200" dirty="0">
+                          <a:solidFill>
+                            <a:schemeClr val="tx1"/>
+                          </a:solidFill>
+                          <a:latin typeface="+mn-lt"/>
+                          <a:ea typeface="+mn-ea"/>
+                          <a:cs typeface="+mn-cs"/>
+                        </a:rPr>
+                        <a:t>3.04038303</a:t>
+                      </a:r>
+                      <a:endParaRPr lang="en-US" dirty="0">
+                        <a:solidFill>
+                          <a:schemeClr val="tx1"/>
+                        </a:solidFill>
+                      </a:endParaRPr>
+                    </a:p>
+                  </a:txBody>
+                  <a:tcPr/>
+                </a:tc>
+                <a:extLst>
+                  <a:ext uri="{0D108BD9-81ED-4DB2-BD59-A6C34878D82A}">
+                    <a16:rowId xmlns:a16="http://schemas.microsoft.com/office/drawing/2014/main" val="3992781458"/>
+                  </a:ext>
+                </a:extLst>
+              </a:tr>
+              <a:tr h="370840">
+                <a:tc>
+                  <a:txBody>
+                    <a:bodyPr/>
+                    <a:lstStyle/>
+                    <a:p>
+                      <a:r>
+                        <a:rPr lang="en-US" dirty="0"/>
+                        <a:t>T_12</a:t>
+                      </a:r>
+                    </a:p>
+                  </a:txBody>
+                  <a:tcPr/>
+                </a:tc>
+                <a:tc>
+                  <a:txBody>
+                    <a:bodyPr/>
+                    <a:lstStyle/>
+                    <a:p>
+                      <a:r>
+                        <a:rPr lang="en-US" dirty="0"/>
+                        <a:t>27.47992853</a:t>
+                      </a:r>
+                    </a:p>
+                  </a:txBody>
+                  <a:tcPr/>
+                </a:tc>
+                <a:tc>
+                  <a:txBody>
+                    <a:bodyPr/>
+                    <a:lstStyle/>
+                    <a:p>
+                      <a:r>
+                        <a:rPr lang="en-US" dirty="0"/>
+                        <a:t>5.26353859</a:t>
+                      </a:r>
+                    </a:p>
+                  </a:txBody>
+                  <a:tcPr/>
+                </a:tc>
+                <a:tc>
+                  <a:txBody>
+                    <a:bodyPr/>
+                    <a:lstStyle/>
+                    <a:p>
+                      <a:r>
+                        <a:rPr lang="en-US" dirty="0">
+                          <a:solidFill>
+                            <a:schemeClr val="tx1"/>
+                          </a:solidFill>
+                        </a:rPr>
+                        <a:t>24.36432521</a:t>
+                      </a:r>
+                    </a:p>
+                  </a:txBody>
+                  <a:tcPr/>
+                </a:tc>
+                <a:tc>
+                  <a:txBody>
+                    <a:bodyPr/>
+                    <a:lstStyle/>
+                    <a:p>
+                      <a:r>
+                        <a:rPr lang="en-US" sz="1800" kern="1200" dirty="0">
+                          <a:solidFill>
+                            <a:schemeClr val="tx1"/>
+                          </a:solidFill>
+                          <a:latin typeface="+mn-lt"/>
+                          <a:ea typeface="+mn-ea"/>
+                          <a:cs typeface="+mn-cs"/>
+                        </a:rPr>
+                        <a:t>0.79722362</a:t>
+                      </a:r>
+                      <a:endParaRPr lang="en-US" dirty="0">
+                        <a:solidFill>
+                          <a:schemeClr val="tx1"/>
+                        </a:solidFill>
+                      </a:endParaRPr>
+                    </a:p>
+                  </a:txBody>
+                  <a:tcPr/>
+                </a:tc>
+                <a:extLst>
+                  <a:ext uri="{0D108BD9-81ED-4DB2-BD59-A6C34878D82A}">
+                    <a16:rowId xmlns:a16="http://schemas.microsoft.com/office/drawing/2014/main" val="3283572519"/>
+                  </a:ext>
+                </a:extLst>
+              </a:tr>
+              <a:tr h="370840">
+                <a:tc>
+                  <a:txBody>
+                    <a:bodyPr/>
+                    <a:lstStyle/>
+                    <a:p>
+                      <a:r>
+                        <a:rPr lang="en-US" dirty="0"/>
+                        <a:t>T_23</a:t>
+                      </a:r>
+                    </a:p>
+                  </a:txBody>
+                  <a:tcPr/>
+                </a:tc>
+                <a:tc>
+                  <a:txBody>
+                    <a:bodyPr/>
+                    <a:lstStyle/>
+                    <a:p>
+                      <a:r>
+                        <a:rPr lang="en-US" dirty="0"/>
+                        <a:t>N/A</a:t>
+                      </a:r>
+                    </a:p>
+                  </a:txBody>
+                  <a:tcPr/>
+                </a:tc>
+                <a:tc>
+                  <a:txBody>
+                    <a:bodyPr/>
+                    <a:lstStyle/>
+                    <a:p>
+                      <a:r>
+                        <a:rPr lang="en-US" dirty="0"/>
+                        <a:t>N/A</a:t>
+                      </a:r>
+                    </a:p>
+                  </a:txBody>
+                  <a:tcPr/>
+                </a:tc>
+                <a:tc>
+                  <a:txBody>
+                    <a:bodyPr/>
+                    <a:lstStyle/>
+                    <a:p>
+                      <a:r>
+                        <a:rPr lang="en-US" dirty="0">
+                          <a:solidFill>
+                            <a:schemeClr val="tx1"/>
+                          </a:solidFill>
+                        </a:rPr>
+                        <a:t>N/A</a:t>
+                      </a:r>
+                    </a:p>
+                  </a:txBody>
+                  <a:tcPr/>
+                </a:tc>
+                <a:tc>
+                  <a:txBody>
+                    <a:bodyPr/>
+                    <a:lstStyle/>
+                    <a:p>
+                      <a:r>
+                        <a:rPr lang="en-US" sz="1800" kern="1200" dirty="0">
+                          <a:solidFill>
+                            <a:schemeClr val="tx1"/>
+                          </a:solidFill>
+                          <a:latin typeface="+mn-lt"/>
+                          <a:ea typeface="+mn-ea"/>
+                          <a:cs typeface="+mn-cs"/>
+                        </a:rPr>
+                        <a:t>1.54418863</a:t>
+                      </a:r>
+                      <a:endParaRPr lang="en-US" dirty="0">
+                        <a:solidFill>
+                          <a:schemeClr val="tx1"/>
+                        </a:solidFill>
+                      </a:endParaRPr>
+                    </a:p>
+                  </a:txBody>
+                  <a:tcPr/>
+                </a:tc>
+                <a:extLst>
+                  <a:ext uri="{0D108BD9-81ED-4DB2-BD59-A6C34878D82A}">
+                    <a16:rowId xmlns:a16="http://schemas.microsoft.com/office/drawing/2014/main" val="2422470866"/>
+                  </a:ext>
+                </a:extLst>
+              </a:tr>
+            </a:tbl>
+          </a:graphicData>
+        </a:graphic>
+      </p:graphicFrame>
+      <p:sp>
+        <p:nvSpPr>
+          <p:cNvPr id="6" name="TextBox 5">
+            <a:extLst>
+              <a:ext uri="{FF2B5EF4-FFF2-40B4-BE49-F238E27FC236}">
+                <a16:creationId xmlns:a16="http://schemas.microsoft.com/office/drawing/2014/main" id="{7419C400-D799-4ACD-BC31-78961011E4A8}"/>
+              </a:ext>
+            </a:extLst>
+          </p:cNvPr>
+          <p:cNvSpPr txBox="1"/>
+          <p:nvPr/>
+        </p:nvSpPr>
+        <p:spPr>
+          <a:xfrm>
+            <a:off x="7096453" y="1690688"/>
+            <a:ext cx="5095547" cy="1754326"/>
+          </a:xfrm>
+          <a:prstGeom prst="rect">
+            <a:avLst/>
+          </a:prstGeom>
+          <a:noFill/>
+        </p:spPr>
+        <p:txBody>
+          <a:bodyPr wrap="square" rtlCol="0">
+            <a:spAutoFit/>
+          </a:bodyPr>
+          <a:lstStyle/>
+          <a:p>
+            <a:pPr marL="285750" indent="-285750">
+              <a:buFont typeface="Arial" panose="020B0604020202020204" pitchFamily="34" charset="0"/>
+              <a:buChar char="•"/>
+            </a:pPr>
+            <a:r>
+              <a:rPr lang="en-US" dirty="0" err="1"/>
+              <a:t>Nu_a</a:t>
+            </a:r>
+            <a:r>
+              <a:rPr lang="en-US" dirty="0"/>
+              <a:t>: contemporary population relative to ancestral population before first epoch</a:t>
+            </a:r>
+          </a:p>
+          <a:p>
+            <a:pPr marL="285750" indent="-285750">
+              <a:buFont typeface="Arial" panose="020B0604020202020204" pitchFamily="34" charset="0"/>
+              <a:buChar char="•"/>
+            </a:pPr>
+            <a:r>
+              <a:rPr lang="en-US" dirty="0" err="1"/>
+              <a:t>Nu_b</a:t>
+            </a:r>
+            <a:r>
+              <a:rPr lang="en-US" dirty="0"/>
+              <a:t>: contemporary population relative to ancestral population before second epoch</a:t>
+            </a:r>
+          </a:p>
+          <a:p>
+            <a:pPr marL="285750" indent="-285750">
+              <a:buFont typeface="Arial" panose="020B0604020202020204" pitchFamily="34" charset="0"/>
+              <a:buChar char="•"/>
+            </a:pPr>
+            <a:r>
+              <a:rPr lang="en-US" dirty="0"/>
+              <a:t>T_1: Duration of first epoch (units of 2 * </a:t>
+            </a:r>
+            <a:r>
+              <a:rPr lang="en-US" dirty="0" err="1"/>
+              <a:t>N_a</a:t>
+            </a:r>
+            <a:r>
+              <a:rPr lang="en-US" dirty="0"/>
+              <a:t>)</a:t>
+            </a:r>
+          </a:p>
+          <a:p>
+            <a:pPr marL="285750" indent="-285750">
+              <a:buFont typeface="Arial" panose="020B0604020202020204" pitchFamily="34" charset="0"/>
+              <a:buChar char="•"/>
+            </a:pPr>
+            <a:r>
+              <a:rPr lang="en-US" dirty="0"/>
+              <a:t>T_2: Duration of second epoch (units of 2 * </a:t>
+            </a:r>
+            <a:r>
+              <a:rPr lang="en-US" dirty="0" err="1"/>
+              <a:t>N_a</a:t>
+            </a:r>
+            <a:r>
+              <a:rPr lang="en-US" dirty="0"/>
+              <a:t>)</a:t>
+            </a:r>
+          </a:p>
+        </p:txBody>
+      </p:sp>
+    </p:spTree>
+    <p:extLst>
+      <p:ext uri="{BB962C8B-B14F-4D97-AF65-F5344CB8AC3E}">
+        <p14:creationId xmlns:p14="http://schemas.microsoft.com/office/powerpoint/2010/main" val="151847977"/>
+      </p:ext>
+    </p:extLst>
+  </p:cSld>
+  <p:clrMapOvr>
+    <a:masterClrMapping/>
+  </p:clrMapOvr>
+</p:sld>
+</file>
+
+<file path=ppt/slides/slide12.xml><?xml version="1.0" encoding="utf-8"?>
+<p:sld xmlns:a="http://schemas.openxmlformats.org/drawingml/2006/main" xmlns:r="http://schemas.openxmlformats.org/officeDocument/2006/relationships" xmlns:p="http://schemas.openxmlformats.org/presentationml/2006/main">
+  <p:cSld>
+    <p:spTree>
+      <p:nvGrpSpPr>
+        <p:cNvPr id="1" name=""/>
+        <p:cNvGrpSpPr/>
+        <p:nvPr/>
+      </p:nvGrpSpPr>
+      <p:grpSpPr>
+        <a:xfrm>
+          <a:off x="0" y="0"/>
+          <a:ext cx="0" cy="0"/>
+          <a:chOff x="0" y="0"/>
+          <a:chExt cx="0" cy="0"/>
+        </a:xfrm>
+      </p:grpSpPr>
+      <p:sp>
+        <p:nvSpPr>
+          <p:cNvPr id="2" name="Title 1">
+            <a:extLst>
+              <a:ext uri="{FF2B5EF4-FFF2-40B4-BE49-F238E27FC236}">
+                <a16:creationId xmlns:a16="http://schemas.microsoft.com/office/drawing/2014/main" id="{DFBD00F2-943C-4088-9EFD-ED0AD1B6E3BB}"/>
+              </a:ext>
+            </a:extLst>
+          </p:cNvPr>
+          <p:cNvSpPr>
+            <a:spLocks noGrp="1"/>
+          </p:cNvSpPr>
+          <p:nvPr>
+            <p:ph type="title"/>
+          </p:nvPr>
+        </p:nvSpPr>
+        <p:spPr/>
+        <p:txBody>
+          <a:bodyPr/>
+          <a:lstStyle/>
+          <a:p>
+            <a:r>
+              <a:rPr lang="en-US" dirty="0" err="1"/>
+              <a:t>Alistipes</a:t>
+            </a:r>
+            <a:r>
+              <a:rPr lang="en-US" dirty="0"/>
+              <a:t> </a:t>
+            </a:r>
+            <a:r>
+              <a:rPr lang="en-US" dirty="0" err="1"/>
+              <a:t>putredinis</a:t>
+            </a:r>
+            <a:r>
+              <a:rPr lang="en-US" dirty="0"/>
+              <a:t> SFS comparison</a:t>
+            </a:r>
+          </a:p>
+        </p:txBody>
+      </p:sp>
+      <p:pic>
+        <p:nvPicPr>
+          <p:cNvPr id="5" name="Content Placeholder 4" descr="Chart&#10;&#10;Description automatically generated">
+            <a:extLst>
+              <a:ext uri="{FF2B5EF4-FFF2-40B4-BE49-F238E27FC236}">
+                <a16:creationId xmlns:a16="http://schemas.microsoft.com/office/drawing/2014/main" id="{D44E3E67-7366-4D1B-9FE7-18A179E6145F}"/>
+              </a:ext>
+            </a:extLst>
+          </p:cNvPr>
+          <p:cNvPicPr>
+            <a:picLocks noGrp="1" noChangeAspect="1"/>
+          </p:cNvPicPr>
+          <p:nvPr>
+            <p:ph idx="1"/>
+          </p:nvPr>
+        </p:nvPicPr>
+        <p:blipFill>
+          <a:blip r:embed="rId2">
+            <a:extLst>
+              <a:ext uri="{28A0092B-C50C-407E-A947-70E740481C1C}">
+                <a14:useLocalDpi xmlns:a14="http://schemas.microsoft.com/office/drawing/2010/main" val="0"/>
+              </a:ext>
+            </a:extLst>
+          </a:blip>
+          <a:stretch>
+            <a:fillRect/>
+          </a:stretch>
+        </p:blipFill>
+        <p:spPr>
+          <a:xfrm>
+            <a:off x="0" y="1371600"/>
+            <a:ext cx="8070504" cy="5486400"/>
+          </a:xfrm>
+        </p:spPr>
+      </p:pic>
+      <p:sp>
+        <p:nvSpPr>
+          <p:cNvPr id="6" name="TextBox 5">
+            <a:extLst>
+              <a:ext uri="{FF2B5EF4-FFF2-40B4-BE49-F238E27FC236}">
+                <a16:creationId xmlns:a16="http://schemas.microsoft.com/office/drawing/2014/main" id="{4BB8BE3A-9A30-44C9-8557-C1306CAA6AAF}"/>
+              </a:ext>
+            </a:extLst>
+          </p:cNvPr>
+          <p:cNvSpPr txBox="1"/>
+          <p:nvPr/>
+        </p:nvSpPr>
+        <p:spPr>
+          <a:xfrm>
+            <a:off x="8440157" y="1690688"/>
+            <a:ext cx="3482235" cy="2862322"/>
+          </a:xfrm>
+          <a:prstGeom prst="rect">
+            <a:avLst/>
+          </a:prstGeom>
+          <a:noFill/>
+        </p:spPr>
+        <p:txBody>
+          <a:bodyPr wrap="square" rtlCol="0">
+            <a:spAutoFit/>
+          </a:bodyPr>
+          <a:lstStyle/>
+          <a:p>
+            <a:pPr marL="285750" indent="-285750">
+              <a:buFont typeface="Arial" panose="020B0604020202020204" pitchFamily="34" charset="0"/>
+              <a:buChar char="•"/>
+            </a:pPr>
+            <a:r>
+              <a:rPr lang="en-US" dirty="0"/>
+              <a:t>The empirical </a:t>
+            </a:r>
+            <a:r>
+              <a:rPr lang="en-US" dirty="0" err="1"/>
+              <a:t>sfs</a:t>
+            </a:r>
+            <a:r>
+              <a:rPr lang="en-US" dirty="0"/>
+              <a:t> is shown in blue, while the expected SFS under different demographic models is shown in either black, orange, green, or red.</a:t>
+            </a:r>
+          </a:p>
+          <a:p>
+            <a:pPr marL="285750" indent="-285750">
+              <a:buFont typeface="Arial" panose="020B0604020202020204" pitchFamily="34" charset="0"/>
+              <a:buChar char="•"/>
+            </a:pPr>
+            <a:r>
+              <a:rPr lang="en-US" dirty="0"/>
+              <a:t>The expected SFS’s have high precision, i.e., are close to each other, but visibly differ from the empirical SFS, particularly are higher allele frequencies.</a:t>
+            </a:r>
+          </a:p>
+        </p:txBody>
+      </p:sp>
+    </p:spTree>
+    <p:extLst>
+      <p:ext uri="{BB962C8B-B14F-4D97-AF65-F5344CB8AC3E}">
+        <p14:creationId xmlns:p14="http://schemas.microsoft.com/office/powerpoint/2010/main" val="65080310"/>
+      </p:ext>
+    </p:extLst>
+  </p:cSld>
+  <p:clrMapOvr>
+    <a:masterClrMapping/>
+  </p:clrMapOvr>
+</p:sld>
+</file>
+
+<file path=ppt/slides/slide13.xml><?xml version="1.0" encoding="utf-8"?>
+<p:sld xmlns:a="http://schemas.openxmlformats.org/drawingml/2006/main" xmlns:r="http://schemas.openxmlformats.org/officeDocument/2006/relationships" xmlns:p="http://schemas.openxmlformats.org/presentationml/2006/main">
+  <p:cSld>
+    <p:spTree>
+      <p:nvGrpSpPr>
+        <p:cNvPr id="1" name=""/>
+        <p:cNvGrpSpPr/>
+        <p:nvPr/>
+      </p:nvGrpSpPr>
+      <p:grpSpPr>
+        <a:xfrm>
+          <a:off x="0" y="0"/>
+          <a:ext cx="0" cy="0"/>
+          <a:chOff x="0" y="0"/>
+          <a:chExt cx="0" cy="0"/>
+        </a:xfrm>
+      </p:grpSpPr>
+      <p:sp>
+        <p:nvSpPr>
+          <p:cNvPr id="2" name="Title 1">
+            <a:extLst>
+              <a:ext uri="{FF2B5EF4-FFF2-40B4-BE49-F238E27FC236}">
                 <a16:creationId xmlns:a16="http://schemas.microsoft.com/office/drawing/2014/main" id="{FC0C9624-1DBB-4B7A-B446-0EC6DD7756EB}"/>
               </a:ext>
             </a:extLst>
@@ -4813,7 +5931,165 @@
 </p:sld>
 </file>
 
-<file path=ppt/slides/slide11.xml><?xml version="1.0" encoding="utf-8"?>
+<file path=ppt/slides/slide14.xml><?xml version="1.0" encoding="utf-8"?>
+<p:sld xmlns:a="http://schemas.openxmlformats.org/drawingml/2006/main" xmlns:r="http://schemas.openxmlformats.org/officeDocument/2006/relationships" xmlns:p="http://schemas.openxmlformats.org/presentationml/2006/main">
+  <p:cSld>
+    <p:spTree>
+      <p:nvGrpSpPr>
+        <p:cNvPr id="1" name=""/>
+        <p:cNvGrpSpPr/>
+        <p:nvPr/>
+      </p:nvGrpSpPr>
+      <p:grpSpPr>
+        <a:xfrm>
+          <a:off x="0" y="0"/>
+          <a:ext cx="0" cy="0"/>
+          <a:chOff x="0" y="0"/>
+          <a:chExt cx="0" cy="0"/>
+        </a:xfrm>
+      </p:grpSpPr>
+      <p:sp>
+        <p:nvSpPr>
+          <p:cNvPr id="2" name="Title 1">
+            <a:extLst>
+              <a:ext uri="{FF2B5EF4-FFF2-40B4-BE49-F238E27FC236}">
+                <a16:creationId xmlns:a16="http://schemas.microsoft.com/office/drawing/2014/main" id="{DFBD00F2-943C-4088-9EFD-ED0AD1B6E3BB}"/>
+              </a:ext>
+            </a:extLst>
+          </p:cNvPr>
+          <p:cNvSpPr>
+            <a:spLocks noGrp="1"/>
+          </p:cNvSpPr>
+          <p:nvPr>
+            <p:ph type="title"/>
+          </p:nvPr>
+        </p:nvSpPr>
+        <p:spPr/>
+        <p:txBody>
+          <a:bodyPr/>
+          <a:lstStyle/>
+          <a:p>
+            <a:r>
+              <a:rPr lang="en-US" dirty="0"/>
+              <a:t>Bacteroides </a:t>
+            </a:r>
+            <a:r>
+              <a:rPr lang="en-US" dirty="0" err="1"/>
+              <a:t>uniformis</a:t>
+            </a:r>
+            <a:r>
+              <a:rPr lang="en-US" dirty="0"/>
+              <a:t> SFS comparison</a:t>
+            </a:r>
+          </a:p>
+        </p:txBody>
+      </p:sp>
+      <p:pic>
+        <p:nvPicPr>
+          <p:cNvPr id="5" name="Content Placeholder 4" descr="Chart, histogram&#10;&#10;Description automatically generated">
+            <a:extLst>
+              <a:ext uri="{FF2B5EF4-FFF2-40B4-BE49-F238E27FC236}">
+                <a16:creationId xmlns:a16="http://schemas.microsoft.com/office/drawing/2014/main" id="{49387604-A90B-4870-9822-CFBAC86B3CBA}"/>
+              </a:ext>
+            </a:extLst>
+          </p:cNvPr>
+          <p:cNvPicPr>
+            <a:picLocks noGrp="1" noChangeAspect="1"/>
+          </p:cNvPicPr>
+          <p:nvPr>
+            <p:ph idx="1"/>
+          </p:nvPr>
+        </p:nvPicPr>
+        <p:blipFill>
+          <a:blip r:embed="rId2">
+            <a:extLst>
+              <a:ext uri="{28A0092B-C50C-407E-A947-70E740481C1C}">
+                <a14:useLocalDpi xmlns:a14="http://schemas.microsoft.com/office/drawing/2010/main" val="0"/>
+              </a:ext>
+            </a:extLst>
+          </a:blip>
+          <a:stretch>
+            <a:fillRect/>
+          </a:stretch>
+        </p:blipFill>
+        <p:spPr>
+          <a:xfrm>
+            <a:off x="0" y="1371600"/>
+            <a:ext cx="8070504" cy="5486400"/>
+          </a:xfrm>
+        </p:spPr>
+      </p:pic>
+      <p:sp>
+        <p:nvSpPr>
+          <p:cNvPr id="6" name="TextBox 5">
+            <a:extLst>
+              <a:ext uri="{FF2B5EF4-FFF2-40B4-BE49-F238E27FC236}">
+                <a16:creationId xmlns:a16="http://schemas.microsoft.com/office/drawing/2014/main" id="{0A553B6C-080E-47D2-99BA-1F6BD733DE86}"/>
+              </a:ext>
+            </a:extLst>
+          </p:cNvPr>
+          <p:cNvSpPr txBox="1"/>
+          <p:nvPr/>
+        </p:nvSpPr>
+        <p:spPr>
+          <a:xfrm>
+            <a:off x="8440157" y="1690688"/>
+            <a:ext cx="3482235" cy="2862322"/>
+          </a:xfrm>
+          <a:prstGeom prst="rect">
+            <a:avLst/>
+          </a:prstGeom>
+          <a:noFill/>
+        </p:spPr>
+        <p:txBody>
+          <a:bodyPr wrap="square" rtlCol="0">
+            <a:spAutoFit/>
+          </a:bodyPr>
+          <a:lstStyle/>
+          <a:p>
+            <a:pPr marL="285750" indent="-285750">
+              <a:buFont typeface="Arial" panose="020B0604020202020204" pitchFamily="34" charset="0"/>
+              <a:buChar char="•"/>
+            </a:pPr>
+            <a:r>
+              <a:rPr lang="en-US" dirty="0"/>
+              <a:t>The empirical </a:t>
+            </a:r>
+            <a:r>
+              <a:rPr lang="en-US" dirty="0" err="1"/>
+              <a:t>sfs</a:t>
+            </a:r>
+            <a:r>
+              <a:rPr lang="en-US" dirty="0"/>
+              <a:t> is shown in blue, while the expected SFS under different demographic models is shown in either black, orange, green, or red.</a:t>
+            </a:r>
+          </a:p>
+          <a:p>
+            <a:pPr marL="285750" indent="-285750">
+              <a:buFont typeface="Arial" panose="020B0604020202020204" pitchFamily="34" charset="0"/>
+              <a:buChar char="•"/>
+            </a:pPr>
+            <a:r>
+              <a:rPr lang="en-US" dirty="0"/>
+              <a:t>The expected SFS’s have high precision, i.e., are close to each other, but visibly differ from the empirical SFS, particularly are higher allele frequencies.</a:t>
+            </a:r>
+          </a:p>
+        </p:txBody>
+      </p:sp>
+    </p:spTree>
+    <p:extLst>
+      <p:ext uri="{BB962C8B-B14F-4D97-AF65-F5344CB8AC3E}">
+        <p14:creationId xmlns:p14="http://schemas.microsoft.com/office/powerpoint/2010/main" val="1721850339"/>
+      </p:ext>
+    </p:extLst>
+  </p:cSld>
+  <p:clrMapOvr>
+    <a:masterClrMapping/>
+  </p:clrMapOvr>
+</p:sld>
+</file>
+
+<file path=ppt/slides/slide15.xml><?xml version="1.0" encoding="utf-8"?>
 <p:sld xmlns:a="http://schemas.openxmlformats.org/drawingml/2006/main" xmlns:r="http://schemas.openxmlformats.org/officeDocument/2006/relationships" xmlns:p="http://schemas.openxmlformats.org/presentationml/2006/main">
   <p:cSld>
     <p:spTree>
@@ -5514,7 +6790,7 @@
 </p:sld>
 </file>
 
-<file path=ppt/slides/slide12.xml><?xml version="1.0" encoding="utf-8"?>
+<file path=ppt/slides/slide16.xml><?xml version="1.0" encoding="utf-8"?>
 <p:sld xmlns:a="http://schemas.openxmlformats.org/drawingml/2006/main" xmlns:r="http://schemas.openxmlformats.org/officeDocument/2006/relationships" xmlns:p="http://schemas.openxmlformats.org/presentationml/2006/main">
   <p:cSld>
     <p:spTree>
@@ -5536,6 +6812,164 @@
           <p:cNvPr id="2" name="Title 1">
             <a:extLst>
               <a:ext uri="{FF2B5EF4-FFF2-40B4-BE49-F238E27FC236}">
+                <a16:creationId xmlns:a16="http://schemas.microsoft.com/office/drawing/2014/main" id="{DFBD00F2-943C-4088-9EFD-ED0AD1B6E3BB}"/>
+              </a:ext>
+            </a:extLst>
+          </p:cNvPr>
+          <p:cNvSpPr>
+            <a:spLocks noGrp="1"/>
+          </p:cNvSpPr>
+          <p:nvPr>
+            <p:ph type="title"/>
+          </p:nvPr>
+        </p:nvSpPr>
+        <p:spPr/>
+        <p:txBody>
+          <a:bodyPr/>
+          <a:lstStyle/>
+          <a:p>
+            <a:r>
+              <a:rPr lang="en-US" dirty="0"/>
+              <a:t>Eubacterium </a:t>
+            </a:r>
+            <a:r>
+              <a:rPr lang="en-US" dirty="0" err="1"/>
+              <a:t>rectale</a:t>
+            </a:r>
+            <a:r>
+              <a:rPr lang="en-US" dirty="0"/>
+              <a:t> SFS comparison</a:t>
+            </a:r>
+          </a:p>
+        </p:txBody>
+      </p:sp>
+      <p:pic>
+        <p:nvPicPr>
+          <p:cNvPr id="5" name="Content Placeholder 4" descr="Chart, histogram&#10;&#10;Description automatically generated">
+            <a:extLst>
+              <a:ext uri="{FF2B5EF4-FFF2-40B4-BE49-F238E27FC236}">
+                <a16:creationId xmlns:a16="http://schemas.microsoft.com/office/drawing/2014/main" id="{E6089F6B-74CE-4E3B-A4B6-C9607B1F980D}"/>
+              </a:ext>
+            </a:extLst>
+          </p:cNvPr>
+          <p:cNvPicPr>
+            <a:picLocks noGrp="1" noChangeAspect="1"/>
+          </p:cNvPicPr>
+          <p:nvPr>
+            <p:ph idx="1"/>
+          </p:nvPr>
+        </p:nvPicPr>
+        <p:blipFill>
+          <a:blip r:embed="rId2">
+            <a:extLst>
+              <a:ext uri="{28A0092B-C50C-407E-A947-70E740481C1C}">
+                <a14:useLocalDpi xmlns:a14="http://schemas.microsoft.com/office/drawing/2010/main" val="0"/>
+              </a:ext>
+            </a:extLst>
+          </a:blip>
+          <a:stretch>
+            <a:fillRect/>
+          </a:stretch>
+        </p:blipFill>
+        <p:spPr>
+          <a:xfrm>
+            <a:off x="0" y="1371600"/>
+            <a:ext cx="8070504" cy="5486400"/>
+          </a:xfrm>
+        </p:spPr>
+      </p:pic>
+      <p:sp>
+        <p:nvSpPr>
+          <p:cNvPr id="6" name="TextBox 5">
+            <a:extLst>
+              <a:ext uri="{FF2B5EF4-FFF2-40B4-BE49-F238E27FC236}">
+                <a16:creationId xmlns:a16="http://schemas.microsoft.com/office/drawing/2014/main" id="{AA93E47B-0039-494D-BABE-8D0B0E912675}"/>
+              </a:ext>
+            </a:extLst>
+          </p:cNvPr>
+          <p:cNvSpPr txBox="1"/>
+          <p:nvPr/>
+        </p:nvSpPr>
+        <p:spPr>
+          <a:xfrm>
+            <a:off x="8440157" y="1690688"/>
+            <a:ext cx="3482235" cy="2862322"/>
+          </a:xfrm>
+          <a:prstGeom prst="rect">
+            <a:avLst/>
+          </a:prstGeom>
+          <a:noFill/>
+        </p:spPr>
+        <p:txBody>
+          <a:bodyPr wrap="square" rtlCol="0">
+            <a:spAutoFit/>
+          </a:bodyPr>
+          <a:lstStyle/>
+          <a:p>
+            <a:pPr marL="285750" indent="-285750">
+              <a:buFont typeface="Arial" panose="020B0604020202020204" pitchFamily="34" charset="0"/>
+              <a:buChar char="•"/>
+            </a:pPr>
+            <a:r>
+              <a:rPr lang="en-US" dirty="0"/>
+              <a:t>The empirical </a:t>
+            </a:r>
+            <a:r>
+              <a:rPr lang="en-US" dirty="0" err="1"/>
+              <a:t>sfs</a:t>
+            </a:r>
+            <a:r>
+              <a:rPr lang="en-US" dirty="0"/>
+              <a:t> is shown in blue, while the expected SFS under different demographic models is shown in either black, orange, green, or red.</a:t>
+            </a:r>
+          </a:p>
+          <a:p>
+            <a:pPr marL="285750" indent="-285750">
+              <a:buFont typeface="Arial" panose="020B0604020202020204" pitchFamily="34" charset="0"/>
+              <a:buChar char="•"/>
+            </a:pPr>
+            <a:r>
+              <a:rPr lang="en-US" dirty="0"/>
+              <a:t>The expected SFS’s have high precision, i.e., are close to each other, but visibly differ from the empirical SFS, particularly are higher allele frequencies.</a:t>
+            </a:r>
+          </a:p>
+        </p:txBody>
+      </p:sp>
+    </p:spTree>
+    <p:extLst>
+      <p:ext uri="{BB962C8B-B14F-4D97-AF65-F5344CB8AC3E}">
+        <p14:creationId xmlns:p14="http://schemas.microsoft.com/office/powerpoint/2010/main" val="1671922138"/>
+      </p:ext>
+    </p:extLst>
+  </p:cSld>
+  <p:clrMapOvr>
+    <a:masterClrMapping/>
+  </p:clrMapOvr>
+</p:sld>
+</file>
+
+<file path=ppt/slides/slide17.xml><?xml version="1.0" encoding="utf-8"?>
+<p:sld xmlns:a="http://schemas.openxmlformats.org/drawingml/2006/main" xmlns:r="http://schemas.openxmlformats.org/officeDocument/2006/relationships" xmlns:p="http://schemas.openxmlformats.org/presentationml/2006/main">
+  <p:cSld>
+    <p:spTree>
+      <p:nvGrpSpPr>
+        <p:cNvPr id="1" name=""/>
+        <p:cNvGrpSpPr/>
+        <p:nvPr/>
+      </p:nvGrpSpPr>
+      <p:grpSpPr>
+        <a:xfrm>
+          <a:off x="0" y="0"/>
+          <a:ext cx="0" cy="0"/>
+          <a:chOff x="0" y="0"/>
+          <a:chExt cx="0" cy="0"/>
+        </a:xfrm>
+      </p:grpSpPr>
+      <p:sp>
+        <p:nvSpPr>
+          <p:cNvPr id="2" name="Title 1">
+            <a:extLst>
+              <a:ext uri="{FF2B5EF4-FFF2-40B4-BE49-F238E27FC236}">
                 <a16:creationId xmlns:a16="http://schemas.microsoft.com/office/drawing/2014/main" id="{4E7C8A13-C707-46A2-BC69-3C661F012169}"/>
               </a:ext>
             </a:extLst>
@@ -5734,7 +7168,7 @@
 </p:sld>
 </file>
 
-<file path=ppt/slides/slide13.xml><?xml version="1.0" encoding="utf-8"?>
+<file path=ppt/slides/slide18.xml><?xml version="1.0" encoding="utf-8"?>
 <p:sld xmlns:a="http://schemas.openxmlformats.org/drawingml/2006/main" xmlns:r="http://schemas.openxmlformats.org/officeDocument/2006/relationships" xmlns:p="http://schemas.openxmlformats.org/presentationml/2006/main">
   <p:cSld>
     <p:spTree>
@@ -6576,7 +8010,7 @@
 </p:sld>
 </file>
 
-<file path=ppt/slides/slide14.xml><?xml version="1.0" encoding="utf-8"?>
+<file path=ppt/slides/slide19.xml><?xml version="1.0" encoding="utf-8"?>
 <p:sld xmlns:a="http://schemas.openxmlformats.org/drawingml/2006/main" xmlns:r="http://schemas.openxmlformats.org/officeDocument/2006/relationships" xmlns:p="http://schemas.openxmlformats.org/presentationml/2006/main">
   <p:cSld>
     <p:spTree>
@@ -7178,7 +8612,125 @@
 </p:sld>
 </file>
 
-<file path=ppt/slides/slide15.xml><?xml version="1.0" encoding="utf-8"?>
+<file path=ppt/slides/slide2.xml><?xml version="1.0" encoding="utf-8"?>
+<p:sld xmlns:a="http://schemas.openxmlformats.org/drawingml/2006/main" xmlns:r="http://schemas.openxmlformats.org/officeDocument/2006/relationships" xmlns:p="http://schemas.openxmlformats.org/presentationml/2006/main">
+  <p:cSld>
+    <p:spTree>
+      <p:nvGrpSpPr>
+        <p:cNvPr id="1" name=""/>
+        <p:cNvGrpSpPr/>
+        <p:nvPr/>
+      </p:nvGrpSpPr>
+      <p:grpSpPr>
+        <a:xfrm>
+          <a:off x="0" y="0"/>
+          <a:ext cx="0" cy="0"/>
+          <a:chOff x="0" y="0"/>
+          <a:chExt cx="0" cy="0"/>
+        </a:xfrm>
+      </p:grpSpPr>
+      <p:sp>
+        <p:nvSpPr>
+          <p:cNvPr id="2" name="Title 1">
+            <a:extLst>
+              <a:ext uri="{FF2B5EF4-FFF2-40B4-BE49-F238E27FC236}">
+                <a16:creationId xmlns:a16="http://schemas.microsoft.com/office/drawing/2014/main" id="{4C075312-6199-4291-B27A-A0AA47F4906B}"/>
+              </a:ext>
+            </a:extLst>
+          </p:cNvPr>
+          <p:cNvSpPr>
+            <a:spLocks noGrp="1"/>
+          </p:cNvSpPr>
+          <p:nvPr>
+            <p:ph type="title"/>
+          </p:nvPr>
+        </p:nvSpPr>
+        <p:spPr/>
+        <p:txBody>
+          <a:bodyPr/>
+          <a:lstStyle/>
+          <a:p>
+            <a:r>
+              <a:rPr lang="en-US" dirty="0"/>
+              <a:t>Logistics</a:t>
+            </a:r>
+          </a:p>
+        </p:txBody>
+      </p:sp>
+      <p:sp>
+        <p:nvSpPr>
+          <p:cNvPr id="3" name="Content Placeholder 2">
+            <a:extLst>
+              <a:ext uri="{FF2B5EF4-FFF2-40B4-BE49-F238E27FC236}">
+                <a16:creationId xmlns:a16="http://schemas.microsoft.com/office/drawing/2014/main" id="{2BCB6DF1-29D0-4F4B-B557-EF7E341303C8}"/>
+              </a:ext>
+            </a:extLst>
+          </p:cNvPr>
+          <p:cNvSpPr>
+            <a:spLocks noGrp="1"/>
+          </p:cNvSpPr>
+          <p:nvPr>
+            <p:ph idx="1"/>
+          </p:nvPr>
+        </p:nvSpPr>
+        <p:spPr/>
+        <p:txBody>
+          <a:bodyPr/>
+          <a:lstStyle/>
+          <a:p>
+            <a:r>
+              <a:rPr lang="en-US" dirty="0"/>
+              <a:t>As a heads-up I’m helping with some of the Bioinformatics Recruitment stuff this week (Wednesday through Friday), but there shouldn’t be any schedule conflicts with meetings or anything on my end.</a:t>
+            </a:r>
+          </a:p>
+          <a:p>
+            <a:r>
+              <a:rPr lang="en-US" dirty="0"/>
+              <a:t>Bioinformatics recruitment is this week, and EEB + Genetics / Genomics is next week. Do you have any schedule changes?</a:t>
+            </a:r>
+          </a:p>
+          <a:p>
+            <a:r>
+              <a:rPr lang="en-US" dirty="0" err="1"/>
+              <a:t>Izabel</a:t>
+            </a:r>
+            <a:r>
+              <a:rPr lang="en-US" dirty="0"/>
+              <a:t> (new postdoc in Kirk’s group) might want to shift around her lab meeting with us (currently scheduled for Feb 4</a:t>
+            </a:r>
+            <a:r>
+              <a:rPr lang="en-US" baseline="30000" dirty="0"/>
+              <a:t>th</a:t>
+            </a:r>
+            <a:r>
+              <a:rPr lang="en-US" dirty="0"/>
+              <a:t>) so that Kirk can attend and provide input. Feb 4</a:t>
+            </a:r>
+            <a:r>
+              <a:rPr lang="en-US" baseline="30000" dirty="0"/>
+              <a:t>th</a:t>
+            </a:r>
+            <a:r>
+              <a:rPr lang="en-US" dirty="0"/>
+              <a:t> is EEB / Genetics + Genomics recruitment week so he wouldn’t be able to make that meeting. </a:t>
+            </a:r>
+          </a:p>
+        </p:txBody>
+      </p:sp>
+    </p:spTree>
+    <p:extLst>
+      <p:ext uri="{BB962C8B-B14F-4D97-AF65-F5344CB8AC3E}">
+        <p14:creationId xmlns:p14="http://schemas.microsoft.com/office/powerpoint/2010/main" val="2724384995"/>
+      </p:ext>
+    </p:extLst>
+  </p:cSld>
+  <p:clrMapOvr>
+    <a:masterClrMapping/>
+  </p:clrMapOvr>
+</p:sld>
+</file>
+
+<file path=ppt/slides/slide20.xml><?xml version="1.0" encoding="utf-8"?>
 <p:sld xmlns:a="http://schemas.openxmlformats.org/drawingml/2006/main" xmlns:r="http://schemas.openxmlformats.org/officeDocument/2006/relationships" xmlns:p="http://schemas.openxmlformats.org/presentationml/2006/main">
   <p:cSld>
     <p:spTree>
@@ -8314,7 +9866,7 @@
 </p:sld>
 </file>
 
-<file path=ppt/slides/slide16.xml><?xml version="1.0" encoding="utf-8"?>
+<file path=ppt/slides/slide21.xml><?xml version="1.0" encoding="utf-8"?>
 <p:sld xmlns:a="http://schemas.openxmlformats.org/drawingml/2006/main" xmlns:r="http://schemas.openxmlformats.org/officeDocument/2006/relationships" xmlns:p="http://schemas.openxmlformats.org/presentationml/2006/main">
   <p:cSld>
     <p:spTree>
@@ -9042,7 +10594,7 @@
 </p:sld>
 </file>
 
-<file path=ppt/slides/slide17.xml><?xml version="1.0" encoding="utf-8"?>
+<file path=ppt/slides/slide22.xml><?xml version="1.0" encoding="utf-8"?>
 <p:sld xmlns:a="http://schemas.openxmlformats.org/drawingml/2006/main" xmlns:r="http://schemas.openxmlformats.org/officeDocument/2006/relationships" xmlns:p="http://schemas.openxmlformats.org/presentationml/2006/main">
   <p:cSld>
     <p:spTree>
@@ -9114,24 +10666,7 @@
               <a:rPr lang="en-US" dirty="0">
                 <a:sym typeface="Wingdings" panose="05000000000000000000" pitchFamily="2" charset="2"/>
               </a:rPr>
-              <a:t>Touch up plotting script</a:t>
-            </a:r>
-          </a:p>
-          <a:p>
-            <a:pPr lvl="1"/>
-            <a:r>
-              <a:rPr lang="en-US" dirty="0">
-                <a:sym typeface="Wingdings" panose="05000000000000000000" pitchFamily="2" charset="2"/>
-              </a:rPr>
-              <a:t>E.g., parse input and output so that it can quickly plot different a different species.</a:t>
-            </a:r>
-          </a:p>
-          <a:p>
-            <a:r>
-              <a:rPr lang="en-US" dirty="0">
-                <a:sym typeface="Wingdings" panose="05000000000000000000" pitchFamily="2" charset="2"/>
-              </a:rPr>
-              <a:t>Download microbiome data, run Midas</a:t>
+              <a:t>Figure out data download, Midas</a:t>
             </a:r>
           </a:p>
         </p:txBody>
@@ -9149,7 +10684,7 @@
 </p:sld>
 </file>
 
-<file path=ppt/slides/slide18.xml><?xml version="1.0" encoding="utf-8"?>
+<file path=ppt/slides/slide23.xml><?xml version="1.0" encoding="utf-8"?>
 <p:sld xmlns:a="http://schemas.openxmlformats.org/drawingml/2006/main" xmlns:r="http://schemas.openxmlformats.org/officeDocument/2006/relationships" xmlns:p="http://schemas.openxmlformats.org/presentationml/2006/main">
   <p:cSld>
     <p:spTree>
@@ -9254,116 +10789,6 @@
     <p:extLst>
       <p:ext uri="{BB962C8B-B14F-4D97-AF65-F5344CB8AC3E}">
         <p14:creationId xmlns:p14="http://schemas.microsoft.com/office/powerpoint/2010/main" val="2373352003"/>
-      </p:ext>
-    </p:extLst>
-  </p:cSld>
-  <p:clrMapOvr>
-    <a:masterClrMapping/>
-  </p:clrMapOvr>
-</p:sld>
-</file>
-
-<file path=ppt/slides/slide2.xml><?xml version="1.0" encoding="utf-8"?>
-<p:sld xmlns:a="http://schemas.openxmlformats.org/drawingml/2006/main" xmlns:r="http://schemas.openxmlformats.org/officeDocument/2006/relationships" xmlns:p="http://schemas.openxmlformats.org/presentationml/2006/main">
-  <p:cSld>
-    <p:spTree>
-      <p:nvGrpSpPr>
-        <p:cNvPr id="1" name=""/>
-        <p:cNvGrpSpPr/>
-        <p:nvPr/>
-      </p:nvGrpSpPr>
-      <p:grpSpPr>
-        <a:xfrm>
-          <a:off x="0" y="0"/>
-          <a:ext cx="0" cy="0"/>
-          <a:chOff x="0" y="0"/>
-          <a:chExt cx="0" cy="0"/>
-        </a:xfrm>
-      </p:grpSpPr>
-      <p:sp>
-        <p:nvSpPr>
-          <p:cNvPr id="2" name="Title 1">
-            <a:extLst>
-              <a:ext uri="{FF2B5EF4-FFF2-40B4-BE49-F238E27FC236}">
-                <a16:creationId xmlns:a16="http://schemas.microsoft.com/office/drawing/2014/main" id="{4C075312-6199-4291-B27A-A0AA47F4906B}"/>
-              </a:ext>
-            </a:extLst>
-          </p:cNvPr>
-          <p:cNvSpPr>
-            <a:spLocks noGrp="1"/>
-          </p:cNvSpPr>
-          <p:nvPr>
-            <p:ph type="title"/>
-          </p:nvPr>
-        </p:nvSpPr>
-        <p:spPr/>
-        <p:txBody>
-          <a:bodyPr/>
-          <a:lstStyle/>
-          <a:p>
-            <a:r>
-              <a:rPr lang="en-US" dirty="0"/>
-              <a:t>Logistics</a:t>
-            </a:r>
-          </a:p>
-        </p:txBody>
-      </p:sp>
-      <p:sp>
-        <p:nvSpPr>
-          <p:cNvPr id="3" name="Content Placeholder 2">
-            <a:extLst>
-              <a:ext uri="{FF2B5EF4-FFF2-40B4-BE49-F238E27FC236}">
-                <a16:creationId xmlns:a16="http://schemas.microsoft.com/office/drawing/2014/main" id="{2BCB6DF1-29D0-4F4B-B557-EF7E341303C8}"/>
-              </a:ext>
-            </a:extLst>
-          </p:cNvPr>
-          <p:cNvSpPr>
-            <a:spLocks noGrp="1"/>
-          </p:cNvSpPr>
-          <p:nvPr>
-            <p:ph idx="1"/>
-          </p:nvPr>
-        </p:nvSpPr>
-        <p:spPr/>
-        <p:txBody>
-          <a:bodyPr/>
-          <a:lstStyle/>
-          <a:p>
-            <a:r>
-              <a:rPr lang="en-US" dirty="0"/>
-              <a:t>As a heads-up I’m helping with some of the Bioinformatics Recruitment stuff this week (Wednesday through Friday), but there shouldn’t be any schedule conflicts with meetings or anything on my end.</a:t>
-            </a:r>
-          </a:p>
-          <a:p>
-            <a:r>
-              <a:rPr lang="en-US" dirty="0"/>
-              <a:t>Bioinformatics recruitment is this week, and EEB + Genetics / Genomics is next week. Do you have any schedule changes?</a:t>
-            </a:r>
-          </a:p>
-          <a:p>
-            <a:r>
-              <a:rPr lang="en-US" dirty="0" err="1"/>
-              <a:t>Izabel</a:t>
-            </a:r>
-            <a:r>
-              <a:rPr lang="en-US" dirty="0"/>
-              <a:t> might want to shift around her lab meeting with us (currently scheduled for Feb 4</a:t>
-            </a:r>
-            <a:r>
-              <a:rPr lang="en-US" baseline="30000" dirty="0"/>
-              <a:t>th</a:t>
-            </a:r>
-            <a:r>
-              <a:rPr lang="en-US" dirty="0"/>
-              <a:t>) so that Kirk can attend and provide input. </a:t>
-            </a:r>
-          </a:p>
-        </p:txBody>
-      </p:sp>
-    </p:spTree>
-    <p:extLst>
-      <p:ext uri="{BB962C8B-B14F-4D97-AF65-F5344CB8AC3E}">
-        <p14:creationId xmlns:p14="http://schemas.microsoft.com/office/powerpoint/2010/main" val="2724384995"/>
       </p:ext>
     </p:extLst>
   </p:cSld>
@@ -9802,7 +11227,7 @@
         <p:spPr/>
         <p:txBody>
           <a:bodyPr>
-            <a:normAutofit/>
+            <a:normAutofit lnSpcReduction="10000"/>
           </a:bodyPr>
           <a:lstStyle/>
           <a:p>
@@ -9818,7 +11243,7 @@
               <a:rPr lang="en-US" dirty="0">
                 <a:sym typeface="Wingdings" panose="05000000000000000000" pitchFamily="2" charset="2"/>
               </a:rPr>
-              <a:t>“Downloaded” Midas (it’s already on the cluster)</a:t>
+              <a:t>Computed expectation for SFS and compared to empirical</a:t>
             </a:r>
           </a:p>
           <a:p>
@@ -9826,6 +11251,14 @@
               <a:rPr lang="en-US" dirty="0">
                 <a:sym typeface="Wingdings" panose="05000000000000000000" pitchFamily="2" charset="2"/>
               </a:rPr>
+              <a:t>“Downloaded” Midas (it’s already on the cluster, but I can run it)</a:t>
+            </a:r>
+          </a:p>
+          <a:p>
+            <a:r>
+              <a:rPr lang="en-US" dirty="0">
+                <a:sym typeface="Wingdings" panose="05000000000000000000" pitchFamily="2" charset="2"/>
+              </a:rPr>
               <a:t>Download(</a:t>
             </a:r>
             <a:r>
@@ -9838,46 +11271,111 @@
               <a:rPr lang="en-US" dirty="0">
                 <a:sym typeface="Wingdings" panose="05000000000000000000" pitchFamily="2" charset="2"/>
               </a:rPr>
-              <a:t>) Madagascar data</a:t>
-            </a:r>
-          </a:p>
-          <a:p>
+              <a:t>?) Madagascar and Ethiopian data</a:t>
+            </a:r>
+          </a:p>
+          <a:p>
+            <a:pPr lvl="1"/>
             <a:r>
               <a:rPr lang="en-US" dirty="0">
                 <a:sym typeface="Wingdings" panose="05000000000000000000" pitchFamily="2" charset="2"/>
               </a:rPr>
-              <a:t>Download(</a:t>
+              <a:t>I’m a little stumped on this!</a:t>
+            </a:r>
+          </a:p>
+          <a:p>
+            <a:pPr lvl="1"/>
+            <a:r>
+              <a:rPr lang="en-US" dirty="0">
+                <a:sym typeface="Wingdings" panose="05000000000000000000" pitchFamily="2" charset="2"/>
+              </a:rPr>
+              <a:t>It appears that the </a:t>
             </a:r>
             <a:r>
               <a:rPr lang="en-US" dirty="0" err="1">
                 <a:sym typeface="Wingdings" panose="05000000000000000000" pitchFamily="2" charset="2"/>
               </a:rPr>
-              <a:t>ing</a:t>
+              <a:t>sra</a:t>
             </a:r>
             <a:r>
               <a:rPr lang="en-US" dirty="0">
                 <a:sym typeface="Wingdings" panose="05000000000000000000" pitchFamily="2" charset="2"/>
               </a:rPr>
-              <a:t>) Ethiopian data</a:t>
-            </a:r>
-          </a:p>
-          <a:p>
-            <a:pPr lvl="1"/>
+              <a:t> directory: </a:t>
+            </a:r>
             <a:r>
               <a:rPr lang="en-US" dirty="0">
                 <a:sym typeface="Wingdings" panose="05000000000000000000" pitchFamily="2" charset="2"/>
-              </a:rPr>
-              <a:t>Might have those </a:t>
-            </a:r>
-            <a:r>
-              <a:rPr lang="en-US">
+                <a:hlinkClick r:id="rId2"/>
+              </a:rPr>
+              <a:t>ftp://ftp-trace.ncbi.nih.gov/sra/sra-instant/</a:t>
+            </a:r>
+            <a:r>
+              <a:rPr lang="en-US" dirty="0">
                 <a:sym typeface="Wingdings" panose="05000000000000000000" pitchFamily="2" charset="2"/>
               </a:rPr>
-              <a:t>by tomorrow.</a:t>
-            </a:r>
-            <a:endParaRPr lang="en-US" dirty="0">
-              <a:sym typeface="Wingdings" panose="05000000000000000000" pitchFamily="2" charset="2"/>
-            </a:endParaRPr>
+              <a:t> is missing.</a:t>
+            </a:r>
+          </a:p>
+          <a:p>
+            <a:pPr lvl="1"/>
+            <a:r>
+              <a:rPr lang="en-US" dirty="0" err="1">
+                <a:sym typeface="Wingdings" panose="05000000000000000000" pitchFamily="2" charset="2"/>
+              </a:rPr>
+              <a:t>SRAtools</a:t>
+            </a:r>
+            <a:r>
+              <a:rPr lang="en-US" dirty="0">
+                <a:sym typeface="Wingdings" panose="05000000000000000000" pitchFamily="2" charset="2"/>
+              </a:rPr>
+              <a:t> requires GLIBC ver. 2.14, which I can’t </a:t>
+            </a:r>
+            <a:r>
+              <a:rPr lang="en-US" dirty="0" err="1">
+                <a:sym typeface="Wingdings" panose="05000000000000000000" pitchFamily="2" charset="2"/>
+              </a:rPr>
+              <a:t>sudo</a:t>
+            </a:r>
+            <a:r>
+              <a:rPr lang="en-US" dirty="0">
+                <a:sym typeface="Wingdings" panose="05000000000000000000" pitchFamily="2" charset="2"/>
+              </a:rPr>
+              <a:t> apt-update on Hoffman.</a:t>
+            </a:r>
+          </a:p>
+          <a:p>
+            <a:pPr lvl="1"/>
+            <a:r>
+              <a:rPr lang="en-US" dirty="0">
+                <a:sym typeface="Wingdings" panose="05000000000000000000" pitchFamily="2" charset="2"/>
+              </a:rPr>
+              <a:t>I am trying to build some form of </a:t>
+            </a:r>
+            <a:r>
+              <a:rPr lang="en-US" dirty="0" err="1">
+                <a:sym typeface="Wingdings" panose="05000000000000000000" pitchFamily="2" charset="2"/>
+              </a:rPr>
+              <a:t>conda</a:t>
+            </a:r>
+            <a:r>
+              <a:rPr lang="en-US" dirty="0">
+                <a:sym typeface="Wingdings" panose="05000000000000000000" pitchFamily="2" charset="2"/>
+              </a:rPr>
+              <a:t> environment or docker container with </a:t>
+            </a:r>
+            <a:r>
+              <a:rPr lang="en-US" dirty="0" err="1">
+                <a:sym typeface="Wingdings" panose="05000000000000000000" pitchFamily="2" charset="2"/>
+              </a:rPr>
+              <a:t>sratools</a:t>
+            </a:r>
+            <a:r>
+              <a:rPr lang="en-US" dirty="0">
+                <a:sym typeface="Wingdings" panose="05000000000000000000" pitchFamily="2" charset="2"/>
+              </a:rPr>
+              <a:t> on local, and then importing to hoffman2.</a:t>
+            </a:r>
           </a:p>
           <a:p>
             <a:endParaRPr lang="en-US" dirty="0">
@@ -9963,7 +11461,7 @@
         <p:spPr/>
         <p:txBody>
           <a:bodyPr>
-            <a:normAutofit/>
+            <a:normAutofit lnSpcReduction="10000"/>
           </a:bodyPr>
           <a:lstStyle/>
           <a:p>
@@ -10095,6 +11593,17 @@
             <a:r>
               <a:rPr lang="en-US" dirty="0"/>
               <a:t>Compute model params and log likelihood</a:t>
+            </a:r>
+          </a:p>
+          <a:p>
+            <a:pPr lvl="3"/>
+            <a:r>
+              <a:rPr lang="en-US" dirty="0">
+                <a:solidFill>
+                  <a:srgbClr val="FF0000"/>
+                </a:solidFill>
+              </a:rPr>
+              <a:t>Some results were mostly the same (since random seeding is controlled)</a:t>
             </a:r>
           </a:p>
           <a:p>
@@ -10882,6 +12391,164 @@
           <p:cNvPr id="2" name="Title 1">
             <a:extLst>
               <a:ext uri="{FF2B5EF4-FFF2-40B4-BE49-F238E27FC236}">
+                <a16:creationId xmlns:a16="http://schemas.microsoft.com/office/drawing/2014/main" id="{DFBD00F2-943C-4088-9EFD-ED0AD1B6E3BB}"/>
+              </a:ext>
+            </a:extLst>
+          </p:cNvPr>
+          <p:cNvSpPr>
+            <a:spLocks noGrp="1"/>
+          </p:cNvSpPr>
+          <p:nvPr>
+            <p:ph type="title"/>
+          </p:nvPr>
+        </p:nvSpPr>
+        <p:spPr/>
+        <p:txBody>
+          <a:bodyPr/>
+          <a:lstStyle/>
+          <a:p>
+            <a:r>
+              <a:rPr lang="en-US" dirty="0"/>
+              <a:t>Bacteroides </a:t>
+            </a:r>
+            <a:r>
+              <a:rPr lang="en-US" dirty="0" err="1"/>
+              <a:t>vulgatus</a:t>
+            </a:r>
+            <a:r>
+              <a:rPr lang="en-US" dirty="0"/>
+              <a:t> SFS comparison</a:t>
+            </a:r>
+          </a:p>
+        </p:txBody>
+      </p:sp>
+      <p:pic>
+        <p:nvPicPr>
+          <p:cNvPr id="5" name="Content Placeholder 4" descr="Chart&#10;&#10;Description automatically generated">
+            <a:extLst>
+              <a:ext uri="{FF2B5EF4-FFF2-40B4-BE49-F238E27FC236}">
+                <a16:creationId xmlns:a16="http://schemas.microsoft.com/office/drawing/2014/main" id="{470E7ECB-7169-4DF5-835A-8D53E7DC0063}"/>
+              </a:ext>
+            </a:extLst>
+          </p:cNvPr>
+          <p:cNvPicPr>
+            <a:picLocks noGrp="1" noChangeAspect="1"/>
+          </p:cNvPicPr>
+          <p:nvPr>
+            <p:ph idx="1"/>
+          </p:nvPr>
+        </p:nvPicPr>
+        <p:blipFill>
+          <a:blip r:embed="rId2">
+            <a:extLst>
+              <a:ext uri="{28A0092B-C50C-407E-A947-70E740481C1C}">
+                <a14:useLocalDpi xmlns:a14="http://schemas.microsoft.com/office/drawing/2010/main" val="0"/>
+              </a:ext>
+            </a:extLst>
+          </a:blip>
+          <a:stretch>
+            <a:fillRect/>
+          </a:stretch>
+        </p:blipFill>
+        <p:spPr>
+          <a:xfrm>
+            <a:off x="0" y="1211849"/>
+            <a:ext cx="8170549" cy="5486400"/>
+          </a:xfrm>
+        </p:spPr>
+      </p:pic>
+      <p:sp>
+        <p:nvSpPr>
+          <p:cNvPr id="6" name="TextBox 5">
+            <a:extLst>
+              <a:ext uri="{FF2B5EF4-FFF2-40B4-BE49-F238E27FC236}">
+                <a16:creationId xmlns:a16="http://schemas.microsoft.com/office/drawing/2014/main" id="{B17C53D1-DA2E-46C1-BCCE-84E5DB75CA20}"/>
+              </a:ext>
+            </a:extLst>
+          </p:cNvPr>
+          <p:cNvSpPr txBox="1"/>
+          <p:nvPr/>
+        </p:nvSpPr>
+        <p:spPr>
+          <a:xfrm>
+            <a:off x="8440157" y="1690688"/>
+            <a:ext cx="3482235" cy="2862322"/>
+          </a:xfrm>
+          <a:prstGeom prst="rect">
+            <a:avLst/>
+          </a:prstGeom>
+          <a:noFill/>
+        </p:spPr>
+        <p:txBody>
+          <a:bodyPr wrap="square" rtlCol="0">
+            <a:spAutoFit/>
+          </a:bodyPr>
+          <a:lstStyle/>
+          <a:p>
+            <a:pPr marL="285750" indent="-285750">
+              <a:buFont typeface="Arial" panose="020B0604020202020204" pitchFamily="34" charset="0"/>
+              <a:buChar char="•"/>
+            </a:pPr>
+            <a:r>
+              <a:rPr lang="en-US" dirty="0"/>
+              <a:t>The empirical </a:t>
+            </a:r>
+            <a:r>
+              <a:rPr lang="en-US" dirty="0" err="1"/>
+              <a:t>sfs</a:t>
+            </a:r>
+            <a:r>
+              <a:rPr lang="en-US" dirty="0"/>
+              <a:t> is shown in blue, while the expected SFS under different demographic models is shown in either black, orange, green, or red.</a:t>
+            </a:r>
+          </a:p>
+          <a:p>
+            <a:pPr marL="285750" indent="-285750">
+              <a:buFont typeface="Arial" panose="020B0604020202020204" pitchFamily="34" charset="0"/>
+              <a:buChar char="•"/>
+            </a:pPr>
+            <a:r>
+              <a:rPr lang="en-US" dirty="0"/>
+              <a:t>The expected SFS’s have high precision, i.e., are close to each other, but visibly differ from the empirical SFS, particularly are higher allele frequencies.</a:t>
+            </a:r>
+          </a:p>
+        </p:txBody>
+      </p:sp>
+    </p:spTree>
+    <p:extLst>
+      <p:ext uri="{BB962C8B-B14F-4D97-AF65-F5344CB8AC3E}">
+        <p14:creationId xmlns:p14="http://schemas.microsoft.com/office/powerpoint/2010/main" val="2683839365"/>
+      </p:ext>
+    </p:extLst>
+  </p:cSld>
+  <p:clrMapOvr>
+    <a:masterClrMapping/>
+  </p:clrMapOvr>
+</p:sld>
+</file>
+
+<file path=ppt/slides/slide9.xml><?xml version="1.0" encoding="utf-8"?>
+<p:sld xmlns:a="http://schemas.openxmlformats.org/drawingml/2006/main" xmlns:r="http://schemas.openxmlformats.org/officeDocument/2006/relationships" xmlns:p="http://schemas.openxmlformats.org/presentationml/2006/main">
+  <p:cSld>
+    <p:spTree>
+      <p:nvGrpSpPr>
+        <p:cNvPr id="1" name=""/>
+        <p:cNvGrpSpPr/>
+        <p:nvPr/>
+      </p:nvGrpSpPr>
+      <p:grpSpPr>
+        <a:xfrm>
+          <a:off x="0" y="0"/>
+          <a:ext cx="0" cy="0"/>
+          <a:chOff x="0" y="0"/>
+          <a:chExt cx="0" cy="0"/>
+        </a:xfrm>
+      </p:grpSpPr>
+      <p:sp>
+        <p:nvSpPr>
+          <p:cNvPr id="2" name="Title 1">
+            <a:extLst>
+              <a:ext uri="{FF2B5EF4-FFF2-40B4-BE49-F238E27FC236}">
                 <a16:creationId xmlns:a16="http://schemas.microsoft.com/office/drawing/2014/main" id="{FC0C9624-1DBB-4B7A-B446-0EC6DD7756EB}"/>
               </a:ext>
             </a:extLst>
@@ -11552,794 +13219,6 @@
     <p:extLst>
       <p:ext uri="{BB962C8B-B14F-4D97-AF65-F5344CB8AC3E}">
         <p14:creationId xmlns:p14="http://schemas.microsoft.com/office/powerpoint/2010/main" val="534063524"/>
-      </p:ext>
-    </p:extLst>
-  </p:cSld>
-  <p:clrMapOvr>
-    <a:masterClrMapping/>
-  </p:clrMapOvr>
-</p:sld>
-</file>
-
-<file path=ppt/slides/slide9.xml><?xml version="1.0" encoding="utf-8"?>
-<p:sld xmlns:a="http://schemas.openxmlformats.org/drawingml/2006/main" xmlns:r="http://schemas.openxmlformats.org/officeDocument/2006/relationships" xmlns:p="http://schemas.openxmlformats.org/presentationml/2006/main">
-  <p:cSld>
-    <p:spTree>
-      <p:nvGrpSpPr>
-        <p:cNvPr id="1" name=""/>
-        <p:cNvGrpSpPr/>
-        <p:nvPr/>
-      </p:nvGrpSpPr>
-      <p:grpSpPr>
-        <a:xfrm>
-          <a:off x="0" y="0"/>
-          <a:ext cx="0" cy="0"/>
-          <a:chOff x="0" y="0"/>
-          <a:chExt cx="0" cy="0"/>
-        </a:xfrm>
-      </p:grpSpPr>
-      <p:sp>
-        <p:nvSpPr>
-          <p:cNvPr id="2" name="Title 1">
-            <a:extLst>
-              <a:ext uri="{FF2B5EF4-FFF2-40B4-BE49-F238E27FC236}">
-                <a16:creationId xmlns:a16="http://schemas.microsoft.com/office/drawing/2014/main" id="{FC0C9624-1DBB-4B7A-B446-0EC6DD7756EB}"/>
-              </a:ext>
-            </a:extLst>
-          </p:cNvPr>
-          <p:cNvSpPr>
-            <a:spLocks noGrp="1"/>
-          </p:cNvSpPr>
-          <p:nvPr>
-            <p:ph type="title"/>
-          </p:nvPr>
-        </p:nvSpPr>
-        <p:spPr/>
-        <p:txBody>
-          <a:bodyPr/>
-          <a:lstStyle/>
-          <a:p>
-            <a:r>
-              <a:rPr lang="en-US" dirty="0" err="1"/>
-              <a:t>Alistipes</a:t>
-            </a:r>
-            <a:r>
-              <a:rPr lang="en-US" dirty="0"/>
-              <a:t> </a:t>
-            </a:r>
-            <a:r>
-              <a:rPr lang="en-US" dirty="0" err="1"/>
-              <a:t>putredinis</a:t>
-            </a:r>
-            <a:endParaRPr lang="en-US" dirty="0"/>
-          </a:p>
-        </p:txBody>
-      </p:sp>
-      <p:pic>
-        <p:nvPicPr>
-          <p:cNvPr id="5" name="Picture 4">
-            <a:extLst>
-              <a:ext uri="{FF2B5EF4-FFF2-40B4-BE49-F238E27FC236}">
-                <a16:creationId xmlns:a16="http://schemas.microsoft.com/office/drawing/2014/main" id="{F3BC6FCC-6644-42E6-95F0-9583E821429C}"/>
-              </a:ext>
-            </a:extLst>
-          </p:cNvPr>
-          <p:cNvPicPr>
-            <a:picLocks noChangeAspect="1"/>
-          </p:cNvPicPr>
-          <p:nvPr/>
-        </p:nvPicPr>
-        <p:blipFill>
-          <a:blip r:embed="rId2"/>
-          <a:stretch>
-            <a:fillRect/>
-          </a:stretch>
-        </p:blipFill>
-        <p:spPr>
-          <a:xfrm>
-            <a:off x="153870" y="1396409"/>
-            <a:ext cx="7272953" cy="3001130"/>
-          </a:xfrm>
-          <a:prstGeom prst="rect">
-            <a:avLst/>
-          </a:prstGeom>
-        </p:spPr>
-      </p:pic>
-      <p:graphicFrame>
-        <p:nvGraphicFramePr>
-          <p:cNvPr id="4" name="Table 4">
-            <a:extLst>
-              <a:ext uri="{FF2B5EF4-FFF2-40B4-BE49-F238E27FC236}">
-                <a16:creationId xmlns:a16="http://schemas.microsoft.com/office/drawing/2014/main" id="{CED22545-7642-43E5-9E8E-C73593CC5F0F}"/>
-              </a:ext>
-            </a:extLst>
-          </p:cNvPr>
-          <p:cNvGraphicFramePr>
-            <a:graphicFrameLocks noGrp="1"/>
-          </p:cNvGraphicFramePr>
-          <p:nvPr>
-            <p:ph idx="1"/>
-            <p:extLst>
-              <p:ext uri="{D42A27DB-BD31-4B8C-83A1-F6EECF244321}">
-                <p14:modId xmlns:p14="http://schemas.microsoft.com/office/powerpoint/2010/main" val="1777659312"/>
-              </p:ext>
-            </p:extLst>
-          </p:nvPr>
-        </p:nvGraphicFramePr>
-        <p:xfrm>
-          <a:off x="828368" y="4397539"/>
-          <a:ext cx="10515600" cy="2225040"/>
-        </p:xfrm>
-        <a:graphic>
-          <a:graphicData uri="http://schemas.openxmlformats.org/drawingml/2006/table">
-            <a:tbl>
-              <a:tblPr firstRow="1" bandRow="1">
-                <a:tableStyleId>{073A0DAA-6AF3-43AB-8588-CEC1D06C72B9}</a:tableStyleId>
-              </a:tblPr>
-              <a:tblGrid>
-                <a:gridCol w="2103120">
-                  <a:extLst>
-                    <a:ext uri="{9D8B030D-6E8A-4147-A177-3AD203B41FA5}">
-                      <a16:colId xmlns:a16="http://schemas.microsoft.com/office/drawing/2014/main" val="2900726404"/>
-                    </a:ext>
-                  </a:extLst>
-                </a:gridCol>
-                <a:gridCol w="2103120">
-                  <a:extLst>
-                    <a:ext uri="{9D8B030D-6E8A-4147-A177-3AD203B41FA5}">
-                      <a16:colId xmlns:a16="http://schemas.microsoft.com/office/drawing/2014/main" val="2297780930"/>
-                    </a:ext>
-                  </a:extLst>
-                </a:gridCol>
-                <a:gridCol w="2103120">
-                  <a:extLst>
-                    <a:ext uri="{9D8B030D-6E8A-4147-A177-3AD203B41FA5}">
-                      <a16:colId xmlns:a16="http://schemas.microsoft.com/office/drawing/2014/main" val="1352057416"/>
-                    </a:ext>
-                  </a:extLst>
-                </a:gridCol>
-                <a:gridCol w="2103120">
-                  <a:extLst>
-                    <a:ext uri="{9D8B030D-6E8A-4147-A177-3AD203B41FA5}">
-                      <a16:colId xmlns:a16="http://schemas.microsoft.com/office/drawing/2014/main" val="1457082074"/>
-                    </a:ext>
-                  </a:extLst>
-                </a:gridCol>
-                <a:gridCol w="2103120">
-                  <a:extLst>
-                    <a:ext uri="{9D8B030D-6E8A-4147-A177-3AD203B41FA5}">
-                      <a16:colId xmlns:a16="http://schemas.microsoft.com/office/drawing/2014/main" val="633438695"/>
-                    </a:ext>
-                  </a:extLst>
-                </a:gridCol>
-              </a:tblGrid>
-              <a:tr h="370840">
-                <a:tc>
-                  <a:txBody>
-                    <a:bodyPr/>
-                    <a:lstStyle/>
-                    <a:p>
-                      <a:r>
-                        <a:rPr lang="en-US" dirty="0"/>
-                        <a:t>Model</a:t>
-                      </a:r>
-                    </a:p>
-                  </a:txBody>
-                  <a:tcPr/>
-                </a:tc>
-                <a:tc>
-                  <a:txBody>
-                    <a:bodyPr/>
-                    <a:lstStyle/>
-                    <a:p>
-                      <a:r>
-                        <a:rPr lang="en-US" dirty="0"/>
-                        <a:t>Exponential growth</a:t>
-                      </a:r>
-                    </a:p>
-                  </a:txBody>
-                  <a:tcPr/>
-                </a:tc>
-                <a:tc>
-                  <a:txBody>
-                    <a:bodyPr/>
-                    <a:lstStyle/>
-                    <a:p>
-                      <a:r>
-                        <a:rPr lang="en-US" dirty="0"/>
-                        <a:t>Two-epoch</a:t>
-                      </a:r>
-                    </a:p>
-                  </a:txBody>
-                  <a:tcPr/>
-                </a:tc>
-                <a:tc>
-                  <a:txBody>
-                    <a:bodyPr/>
-                    <a:lstStyle/>
-                    <a:p>
-                      <a:r>
-                        <a:rPr lang="en-US" dirty="0"/>
-                        <a:t>Bottleneck + growth</a:t>
-                      </a:r>
-                    </a:p>
-                  </a:txBody>
-                  <a:tcPr/>
-                </a:tc>
-                <a:tc>
-                  <a:txBody>
-                    <a:bodyPr/>
-                    <a:lstStyle/>
-                    <a:p>
-                      <a:r>
-                        <a:rPr lang="en-US" dirty="0"/>
-                        <a:t>Three-epoch</a:t>
-                      </a:r>
-                    </a:p>
-                  </a:txBody>
-                  <a:tcPr/>
-                </a:tc>
-                <a:extLst>
-                  <a:ext uri="{0D108BD9-81ED-4DB2-BD59-A6C34878D82A}">
-                    <a16:rowId xmlns:a16="http://schemas.microsoft.com/office/drawing/2014/main" val="3143057051"/>
-                  </a:ext>
-                </a:extLst>
-              </a:tr>
-              <a:tr h="370840">
-                <a:tc>
-                  <a:txBody>
-                    <a:bodyPr/>
-                    <a:lstStyle/>
-                    <a:p>
-                      <a:r>
-                        <a:rPr lang="en-US" dirty="0"/>
-                        <a:t>Log Likelihood</a:t>
-                      </a:r>
-                    </a:p>
-                  </a:txBody>
-                  <a:tcPr/>
-                </a:tc>
-                <a:tc>
-                  <a:txBody>
-                    <a:bodyPr/>
-                    <a:lstStyle/>
-                    <a:p>
-                      <a:r>
-                        <a:rPr lang="en-US" dirty="0"/>
-                        <a:t>-417.014902652</a:t>
-                      </a:r>
-                    </a:p>
-                  </a:txBody>
-                  <a:tcPr/>
-                </a:tc>
-                <a:tc>
-                  <a:txBody>
-                    <a:bodyPr/>
-                    <a:lstStyle/>
-                    <a:p>
-                      <a:r>
-                        <a:rPr lang="en-US" dirty="0">
-                          <a:highlight>
-                            <a:srgbClr val="FFFF00"/>
-                          </a:highlight>
-                        </a:rPr>
-                        <a:t>-283.836375864</a:t>
-                      </a:r>
-                    </a:p>
-                  </a:txBody>
-                  <a:tcPr/>
-                </a:tc>
-                <a:tc>
-                  <a:txBody>
-                    <a:bodyPr/>
-                    <a:lstStyle/>
-                    <a:p>
-                      <a:r>
-                        <a:rPr lang="en-US" dirty="0">
-                          <a:solidFill>
-                            <a:srgbClr val="FF0000"/>
-                          </a:solidFill>
-                        </a:rPr>
-                        <a:t>-1666.69273895</a:t>
-                      </a:r>
-                      <a:endParaRPr lang="en-US" dirty="0">
-                        <a:solidFill>
-                          <a:srgbClr val="FF0000"/>
-                        </a:solidFill>
-                        <a:highlight>
-                          <a:srgbClr val="FFFF00"/>
-                        </a:highlight>
-                      </a:endParaRPr>
-                    </a:p>
-                  </a:txBody>
-                  <a:tcPr/>
-                </a:tc>
-                <a:tc>
-                  <a:txBody>
-                    <a:bodyPr/>
-                    <a:lstStyle/>
-                    <a:p>
-                      <a:r>
-                        <a:rPr lang="en-US" sz="1800" kern="1200" dirty="0">
-                          <a:solidFill>
-                            <a:srgbClr val="FF0000"/>
-                          </a:solidFill>
-                          <a:latin typeface="+mn-lt"/>
-                          <a:ea typeface="+mn-ea"/>
-                          <a:cs typeface="+mn-cs"/>
-                        </a:rPr>
-                        <a:t>-1670.63816752</a:t>
-                      </a:r>
-                      <a:endParaRPr lang="en-US" dirty="0">
-                        <a:solidFill>
-                          <a:srgbClr val="FF0000"/>
-                        </a:solidFill>
-                      </a:endParaRPr>
-                    </a:p>
-                  </a:txBody>
-                  <a:tcPr/>
-                </a:tc>
-                <a:extLst>
-                  <a:ext uri="{0D108BD9-81ED-4DB2-BD59-A6C34878D82A}">
-                    <a16:rowId xmlns:a16="http://schemas.microsoft.com/office/drawing/2014/main" val="3235037204"/>
-                  </a:ext>
-                </a:extLst>
-              </a:tr>
-              <a:tr h="370840">
-                <a:tc>
-                  <a:txBody>
-                    <a:bodyPr/>
-                    <a:lstStyle/>
-                    <a:p>
-                      <a:r>
-                        <a:rPr lang="en-US" dirty="0" err="1"/>
-                        <a:t>Nu_a</a:t>
-                      </a:r>
-                      <a:endParaRPr lang="en-US" dirty="0"/>
-                    </a:p>
-                  </a:txBody>
-                  <a:tcPr/>
-                </a:tc>
-                <a:tc>
-                  <a:txBody>
-                    <a:bodyPr/>
-                    <a:lstStyle/>
-                    <a:p>
-                      <a:r>
-                        <a:rPr lang="en-US" dirty="0"/>
-                        <a:t>37.70628513</a:t>
-                      </a:r>
-                    </a:p>
-                  </a:txBody>
-                  <a:tcPr/>
-                </a:tc>
-                <a:tc>
-                  <a:txBody>
-                    <a:bodyPr/>
-                    <a:lstStyle/>
-                    <a:p>
-                      <a:r>
-                        <a:rPr lang="en-US" dirty="0"/>
-                        <a:t>12.85982032</a:t>
-                      </a:r>
-                    </a:p>
-                  </a:txBody>
-                  <a:tcPr/>
-                </a:tc>
-                <a:tc>
-                  <a:txBody>
-                    <a:bodyPr/>
-                    <a:lstStyle/>
-                    <a:p>
-                      <a:r>
-                        <a:rPr lang="en-US" dirty="0">
-                          <a:solidFill>
-                            <a:srgbClr val="FF0000"/>
-                          </a:solidFill>
-                        </a:rPr>
-                        <a:t>2.72608089e-01</a:t>
-                      </a:r>
-                    </a:p>
-                  </a:txBody>
-                  <a:tcPr/>
-                </a:tc>
-                <a:tc>
-                  <a:txBody>
-                    <a:bodyPr/>
-                    <a:lstStyle/>
-                    <a:p>
-                      <a:r>
-                        <a:rPr lang="en-US" sz="1800" kern="1200" dirty="0">
-                          <a:solidFill>
-                            <a:srgbClr val="FF0000"/>
-                          </a:solidFill>
-                          <a:latin typeface="+mn-lt"/>
-                          <a:ea typeface="+mn-ea"/>
-                          <a:cs typeface="+mn-cs"/>
-                        </a:rPr>
-                        <a:t>0.40136306</a:t>
-                      </a:r>
-                      <a:endParaRPr lang="en-US" dirty="0">
-                        <a:solidFill>
-                          <a:srgbClr val="FF0000"/>
-                        </a:solidFill>
-                      </a:endParaRPr>
-                    </a:p>
-                  </a:txBody>
-                  <a:tcPr/>
-                </a:tc>
-                <a:extLst>
-                  <a:ext uri="{0D108BD9-81ED-4DB2-BD59-A6C34878D82A}">
-                    <a16:rowId xmlns:a16="http://schemas.microsoft.com/office/drawing/2014/main" val="2717148640"/>
-                  </a:ext>
-                </a:extLst>
-              </a:tr>
-              <a:tr h="370840">
-                <a:tc>
-                  <a:txBody>
-                    <a:bodyPr/>
-                    <a:lstStyle/>
-                    <a:p>
-                      <a:r>
-                        <a:rPr lang="en-US" dirty="0" err="1"/>
-                        <a:t>Nu_b</a:t>
-                      </a:r>
-                      <a:endParaRPr lang="en-US" dirty="0"/>
-                    </a:p>
-                  </a:txBody>
-                  <a:tcPr/>
-                </a:tc>
-                <a:tc>
-                  <a:txBody>
-                    <a:bodyPr/>
-                    <a:lstStyle/>
-                    <a:p>
-                      <a:r>
-                        <a:rPr lang="en-US" dirty="0"/>
-                        <a:t>N/A</a:t>
-                      </a:r>
-                    </a:p>
-                  </a:txBody>
-                  <a:tcPr/>
-                </a:tc>
-                <a:tc>
-                  <a:txBody>
-                    <a:bodyPr/>
-                    <a:lstStyle/>
-                    <a:p>
-                      <a:r>
-                        <a:rPr lang="en-US" dirty="0"/>
-                        <a:t>N/A</a:t>
-                      </a:r>
-                    </a:p>
-                  </a:txBody>
-                  <a:tcPr/>
-                </a:tc>
-                <a:tc>
-                  <a:txBody>
-                    <a:bodyPr/>
-                    <a:lstStyle/>
-                    <a:p>
-                      <a:r>
-                        <a:rPr lang="en-US" dirty="0">
-                          <a:solidFill>
-                            <a:srgbClr val="FF0000"/>
-                          </a:solidFill>
-                        </a:rPr>
-                        <a:t>2.93160455e-01</a:t>
-                      </a:r>
-                    </a:p>
-                  </a:txBody>
-                  <a:tcPr/>
-                </a:tc>
-                <a:tc>
-                  <a:txBody>
-                    <a:bodyPr/>
-                    <a:lstStyle/>
-                    <a:p>
-                      <a:r>
-                        <a:rPr lang="en-US" sz="1800" kern="1200" dirty="0">
-                          <a:solidFill>
-                            <a:srgbClr val="FF0000"/>
-                          </a:solidFill>
-                          <a:latin typeface="+mn-lt"/>
-                          <a:ea typeface="+mn-ea"/>
-                          <a:cs typeface="+mn-cs"/>
-                        </a:rPr>
-                        <a:t>0.749287</a:t>
-                      </a:r>
-                      <a:endParaRPr lang="en-US" dirty="0">
-                        <a:solidFill>
-                          <a:srgbClr val="FF0000"/>
-                        </a:solidFill>
-                      </a:endParaRPr>
-                    </a:p>
-                  </a:txBody>
-                  <a:tcPr/>
-                </a:tc>
-                <a:extLst>
-                  <a:ext uri="{0D108BD9-81ED-4DB2-BD59-A6C34878D82A}">
-                    <a16:rowId xmlns:a16="http://schemas.microsoft.com/office/drawing/2014/main" val="3992781458"/>
-                  </a:ext>
-                </a:extLst>
-              </a:tr>
-              <a:tr h="370840">
-                <a:tc>
-                  <a:txBody>
-                    <a:bodyPr/>
-                    <a:lstStyle/>
-                    <a:p>
-                      <a:r>
-                        <a:rPr lang="en-US" dirty="0"/>
-                        <a:t>T_12</a:t>
-                      </a:r>
-                    </a:p>
-                  </a:txBody>
-                  <a:tcPr/>
-                </a:tc>
-                <a:tc>
-                  <a:txBody>
-                    <a:bodyPr/>
-                    <a:lstStyle/>
-                    <a:p>
-                      <a:r>
-                        <a:rPr lang="en-US" dirty="0"/>
-                        <a:t>27.47992853</a:t>
-                      </a:r>
-                    </a:p>
-                  </a:txBody>
-                  <a:tcPr/>
-                </a:tc>
-                <a:tc>
-                  <a:txBody>
-                    <a:bodyPr/>
-                    <a:lstStyle/>
-                    <a:p>
-                      <a:r>
-                        <a:rPr lang="en-US" dirty="0"/>
-                        <a:t>5.26353859</a:t>
-                      </a:r>
-                    </a:p>
-                  </a:txBody>
-                  <a:tcPr/>
-                </a:tc>
-                <a:tc>
-                  <a:txBody>
-                    <a:bodyPr/>
-                    <a:lstStyle/>
-                    <a:p>
-                      <a:r>
-                        <a:rPr lang="en-US" dirty="0">
-                          <a:solidFill>
-                            <a:srgbClr val="FF0000"/>
-                          </a:solidFill>
-                        </a:rPr>
-                        <a:t>2.67384328e-09</a:t>
-                      </a:r>
-                    </a:p>
-                  </a:txBody>
-                  <a:tcPr/>
-                </a:tc>
-                <a:tc>
-                  <a:txBody>
-                    <a:bodyPr/>
-                    <a:lstStyle/>
-                    <a:p>
-                      <a:r>
-                        <a:rPr lang="en-US" sz="1800" kern="1200" dirty="0">
-                          <a:solidFill>
-                            <a:srgbClr val="FF0000"/>
-                          </a:solidFill>
-                          <a:latin typeface="+mn-lt"/>
-                          <a:ea typeface="+mn-ea"/>
-                          <a:cs typeface="+mn-cs"/>
-                        </a:rPr>
-                        <a:t>0.17426896</a:t>
-                      </a:r>
-                      <a:endParaRPr lang="en-US" dirty="0">
-                        <a:solidFill>
-                          <a:srgbClr val="FF0000"/>
-                        </a:solidFill>
-                      </a:endParaRPr>
-                    </a:p>
-                  </a:txBody>
-                  <a:tcPr/>
-                </a:tc>
-                <a:extLst>
-                  <a:ext uri="{0D108BD9-81ED-4DB2-BD59-A6C34878D82A}">
-                    <a16:rowId xmlns:a16="http://schemas.microsoft.com/office/drawing/2014/main" val="3283572519"/>
-                  </a:ext>
-                </a:extLst>
-              </a:tr>
-              <a:tr h="370840">
-                <a:tc>
-                  <a:txBody>
-                    <a:bodyPr/>
-                    <a:lstStyle/>
-                    <a:p>
-                      <a:r>
-                        <a:rPr lang="en-US" dirty="0"/>
-                        <a:t>T_23</a:t>
-                      </a:r>
-                    </a:p>
-                  </a:txBody>
-                  <a:tcPr/>
-                </a:tc>
-                <a:tc>
-                  <a:txBody>
-                    <a:bodyPr/>
-                    <a:lstStyle/>
-                    <a:p>
-                      <a:r>
-                        <a:rPr lang="en-US" dirty="0"/>
-                        <a:t>N/A</a:t>
-                      </a:r>
-                    </a:p>
-                  </a:txBody>
-                  <a:tcPr/>
-                </a:tc>
-                <a:tc>
-                  <a:txBody>
-                    <a:bodyPr/>
-                    <a:lstStyle/>
-                    <a:p>
-                      <a:r>
-                        <a:rPr lang="en-US" dirty="0"/>
-                        <a:t>N/A</a:t>
-                      </a:r>
-                    </a:p>
-                  </a:txBody>
-                  <a:tcPr/>
-                </a:tc>
-                <a:tc>
-                  <a:txBody>
-                    <a:bodyPr/>
-                    <a:lstStyle/>
-                    <a:p>
-                      <a:r>
-                        <a:rPr lang="en-US" dirty="0">
-                          <a:solidFill>
-                            <a:srgbClr val="FF0000"/>
-                          </a:solidFill>
-                        </a:rPr>
-                        <a:t>N/A</a:t>
-                      </a:r>
-                    </a:p>
-                  </a:txBody>
-                  <a:tcPr/>
-                </a:tc>
-                <a:tc>
-                  <a:txBody>
-                    <a:bodyPr/>
-                    <a:lstStyle/>
-                    <a:p>
-                      <a:r>
-                        <a:rPr lang="en-US" sz="1800" kern="1200" dirty="0">
-                          <a:solidFill>
-                            <a:srgbClr val="FF0000"/>
-                          </a:solidFill>
-                          <a:latin typeface="+mn-lt"/>
-                          <a:ea typeface="+mn-ea"/>
-                          <a:cs typeface="+mn-cs"/>
-                        </a:rPr>
-                        <a:t>0.09401605</a:t>
-                      </a:r>
-                      <a:endParaRPr lang="en-US" dirty="0">
-                        <a:solidFill>
-                          <a:srgbClr val="FF0000"/>
-                        </a:solidFill>
-                      </a:endParaRPr>
-                    </a:p>
-                  </a:txBody>
-                  <a:tcPr/>
-                </a:tc>
-                <a:extLst>
-                  <a:ext uri="{0D108BD9-81ED-4DB2-BD59-A6C34878D82A}">
-                    <a16:rowId xmlns:a16="http://schemas.microsoft.com/office/drawing/2014/main" val="2422470866"/>
-                  </a:ext>
-                </a:extLst>
-              </a:tr>
-            </a:tbl>
-          </a:graphicData>
-        </a:graphic>
-      </p:graphicFrame>
-      <p:sp>
-        <p:nvSpPr>
-          <p:cNvPr id="6" name="TextBox 5">
-            <a:extLst>
-              <a:ext uri="{FF2B5EF4-FFF2-40B4-BE49-F238E27FC236}">
-                <a16:creationId xmlns:a16="http://schemas.microsoft.com/office/drawing/2014/main" id="{7419C400-D799-4ACD-BC31-78961011E4A8}"/>
-              </a:ext>
-            </a:extLst>
-          </p:cNvPr>
-          <p:cNvSpPr txBox="1"/>
-          <p:nvPr/>
-        </p:nvSpPr>
-        <p:spPr>
-          <a:xfrm>
-            <a:off x="7096453" y="1690688"/>
-            <a:ext cx="5095547" cy="1754326"/>
-          </a:xfrm>
-          <a:prstGeom prst="rect">
-            <a:avLst/>
-          </a:prstGeom>
-          <a:noFill/>
-        </p:spPr>
-        <p:txBody>
-          <a:bodyPr wrap="square" rtlCol="0">
-            <a:spAutoFit/>
-          </a:bodyPr>
-          <a:lstStyle/>
-          <a:p>
-            <a:pPr marL="285750" indent="-285750">
-              <a:buFont typeface="Arial" panose="020B0604020202020204" pitchFamily="34" charset="0"/>
-              <a:buChar char="•"/>
-            </a:pPr>
-            <a:r>
-              <a:rPr lang="en-US" dirty="0" err="1"/>
-              <a:t>Nu_a</a:t>
-            </a:r>
-            <a:r>
-              <a:rPr lang="en-US" dirty="0"/>
-              <a:t>: contemporary population relative to ancestral population before first epoch</a:t>
-            </a:r>
-          </a:p>
-          <a:p>
-            <a:pPr marL="285750" indent="-285750">
-              <a:buFont typeface="Arial" panose="020B0604020202020204" pitchFamily="34" charset="0"/>
-              <a:buChar char="•"/>
-            </a:pPr>
-            <a:r>
-              <a:rPr lang="en-US" dirty="0" err="1"/>
-              <a:t>Nu_b</a:t>
-            </a:r>
-            <a:r>
-              <a:rPr lang="en-US" dirty="0"/>
-              <a:t>: contemporary population relative to ancestral population before second epoch</a:t>
-            </a:r>
-          </a:p>
-          <a:p>
-            <a:pPr marL="285750" indent="-285750">
-              <a:buFont typeface="Arial" panose="020B0604020202020204" pitchFamily="34" charset="0"/>
-              <a:buChar char="•"/>
-            </a:pPr>
-            <a:r>
-              <a:rPr lang="en-US" dirty="0"/>
-              <a:t>T_1: Duration of first epoch (units of 2 * </a:t>
-            </a:r>
-            <a:r>
-              <a:rPr lang="en-US" dirty="0" err="1"/>
-              <a:t>N_a</a:t>
-            </a:r>
-            <a:r>
-              <a:rPr lang="en-US" dirty="0"/>
-              <a:t>)</a:t>
-            </a:r>
-          </a:p>
-          <a:p>
-            <a:pPr marL="285750" indent="-285750">
-              <a:buFont typeface="Arial" panose="020B0604020202020204" pitchFamily="34" charset="0"/>
-              <a:buChar char="•"/>
-            </a:pPr>
-            <a:r>
-              <a:rPr lang="en-US" dirty="0"/>
-              <a:t>T_2: Duration of second epoch (units of 2 * </a:t>
-            </a:r>
-            <a:r>
-              <a:rPr lang="en-US" dirty="0" err="1"/>
-              <a:t>N_a</a:t>
-            </a:r>
-            <a:r>
-              <a:rPr lang="en-US" dirty="0"/>
-              <a:t>)</a:t>
-            </a:r>
-          </a:p>
-        </p:txBody>
-      </p:sp>
-    </p:spTree>
-    <p:extLst>
-      <p:ext uri="{BB962C8B-B14F-4D97-AF65-F5344CB8AC3E}">
-        <p14:creationId xmlns:p14="http://schemas.microsoft.com/office/powerpoint/2010/main" val="151847977"/>
       </p:ext>
     </p:extLst>
   </p:cSld>

</xml_diff>